<commit_message>
cambios menores de elementos tesis y mi presentación
</commit_message>
<xml_diff>
--- a/Sesion Especial/Sergio Nava/Presentación SMNM.pptx
+++ b/Sesion Especial/Sergio Nava/Presentación SMNM.pptx
@@ -5,48 +5,50 @@
     <p:sldMasterId id="2147483683" r:id="rId1"/>
   </p:sldMasterIdLst>
   <p:notesMasterIdLst>
-    <p:notesMasterId r:id="rId10"/>
+    <p:notesMasterId r:id="rId12"/>
   </p:notesMasterIdLst>
   <p:sldIdLst>
     <p:sldId id="257" r:id="rId2"/>
     <p:sldId id="258" r:id="rId3"/>
     <p:sldId id="260" r:id="rId4"/>
-    <p:sldId id="264" r:id="rId5"/>
-    <p:sldId id="265" r:id="rId6"/>
-    <p:sldId id="263" r:id="rId7"/>
-    <p:sldId id="266" r:id="rId8"/>
-    <p:sldId id="261" r:id="rId9"/>
+    <p:sldId id="268" r:id="rId5"/>
+    <p:sldId id="267" r:id="rId6"/>
+    <p:sldId id="264" r:id="rId7"/>
+    <p:sldId id="265" r:id="rId8"/>
+    <p:sldId id="263" r:id="rId9"/>
+    <p:sldId id="266" r:id="rId10"/>
+    <p:sldId id="261" r:id="rId11"/>
   </p:sldIdLst>
   <p:sldSz cx="9144000" cy="6858000" type="screen4x3"/>
   <p:notesSz cx="6858000" cy="9144000"/>
   <p:embeddedFontLst>
     <p:embeddedFont>
       <p:font typeface="Calibri" panose="020F0502020204030204" pitchFamily="34" charset="0"/>
-      <p:regular r:id="rId11"/>
-      <p:bold r:id="rId12"/>
-      <p:italic r:id="rId13"/>
-      <p:boldItalic r:id="rId14"/>
+      <p:regular r:id="rId13"/>
+      <p:bold r:id="rId14"/>
+      <p:italic r:id="rId15"/>
+      <p:boldItalic r:id="rId16"/>
     </p:embeddedFont>
     <p:embeddedFont>
-      <p:font typeface="Gill Sans MT" panose="020B0502020104020203" pitchFamily="34" charset="77"/>
-      <p:regular r:id="rId15"/>
-      <p:bold r:id="rId16"/>
-      <p:italic r:id="rId17"/>
-      <p:boldItalic r:id="rId18"/>
+      <p:font typeface="Gill Sans MT" panose="020B0502020104020203" pitchFamily="34" charset="0"/>
+      <p:regular r:id="rId17"/>
+      <p:bold r:id="rId18"/>
+      <p:italic r:id="rId19"/>
+      <p:boldItalic r:id="rId20"/>
     </p:embeddedFont>
     <p:embeddedFont>
-      <p:font typeface="Montserrat" pitchFamily="2" charset="77"/>
-      <p:regular r:id="rId19"/>
-      <p:bold r:id="rId20"/>
-      <p:italic r:id="rId21"/>
-      <p:boldItalic r:id="rId22"/>
+      <p:font typeface="Montserrat" panose="00000500000000000000" pitchFamily="2" charset="0"/>
+      <p:regular r:id="rId21"/>
+      <p:bold r:id="rId22"/>
+      <p:italic r:id="rId23"/>
+      <p:boldItalic r:id="rId24"/>
     </p:embeddedFont>
     <p:embeddedFont>
-      <p:font typeface="Montserrat SemiBold" pitchFamily="2" charset="77"/>
-      <p:regular r:id="rId23"/>
-      <p:bold r:id="rId24"/>
-      <p:italic r:id="rId25"/>
-      <p:boldItalic r:id="rId26"/>
+      <p:font typeface="Montserrat SemiBold" panose="00000700000000000000" pitchFamily="2" charset="0"/>
+      <p:regular r:id="rId25"/>
+      <p:bold r:id="rId26"/>
+      <p:italic r:id="rId27"/>
+      <p:boldItalic r:id="rId28"/>
     </p:embeddedFont>
   </p:embeddedFontLst>
   <p:defaultTextStyle>
@@ -149,7 +151,7 @@
       <p15:sldGuideLst xmlns:p15="http://schemas.microsoft.com/office/powerpoint/2012/main"/>
     </p:ext>
     <p:ext uri="http://customooxmlschemas.google.com/">
-      <go:slidesCustomData xmlns:go="http://customooxmlschemas.google.com/" xmlns:ahyp="http://schemas.microsoft.com/office/drawing/2018/hyperlinkcolor" xmlns:p15="http://schemas.microsoft.com/office/powerpoint/2012/main" xmlns:p14="http://schemas.microsoft.com/office/powerpoint/2010/main" xmlns:com="http://schemas.openxmlformats.org/drawingml/2006/compatibility" xmlns:pvml="urn:schemas-microsoft-com:office:powerpoint" xmlns:v="urn:schemas-microsoft-com:vml" xmlns:o="urn:schemas-microsoft-com:office:office" xmlns:dgm="http://schemas.openxmlformats.org/drawingml/2006/diagram" xmlns:c="http://schemas.openxmlformats.org/drawingml/2006/chart" xmlns:mv="urn:schemas-microsoft-com:mac:vml" xmlns:mc="http://schemas.openxmlformats.org/markup-compatibility/2006" xmlns="" r:id="rId28" roundtripDataSignature="AMtx7mhsYcODDan9HmJtaWqDDE5keU7a3g=="/>
+      <go:slidesCustomData xmlns="" xmlns:mc="http://schemas.openxmlformats.org/markup-compatibility/2006" xmlns:mv="urn:schemas-microsoft-com:mac:vml" xmlns:c="http://schemas.openxmlformats.org/drawingml/2006/chart" xmlns:dgm="http://schemas.openxmlformats.org/drawingml/2006/diagram" xmlns:o="urn:schemas-microsoft-com:office:office" xmlns:v="urn:schemas-microsoft-com:vml" xmlns:pvml="urn:schemas-microsoft-com:office:powerpoint" xmlns:com="http://schemas.openxmlformats.org/drawingml/2006/compatibility" xmlns:p14="http://schemas.microsoft.com/office/powerpoint/2010/main" xmlns:p15="http://schemas.microsoft.com/office/powerpoint/2012/main" xmlns:ahyp="http://schemas.microsoft.com/office/drawing/2018/hyperlinkcolor" xmlns:go="http://customooxmlschemas.google.com/" r:id="rId29" roundtripDataSignature="AMtx7mhsYcODDan9HmJtaWqDDE5keU7a3g=="/>
     </p:ext>
   </p:extLst>
 </p:presentation>
@@ -1359,7 +1361,7 @@
                 <a:cs typeface="Calibri"/>
                 <a:sym typeface="Calibri"/>
               </a:rPr>
-              <a:t>‹#›</a:t>
+              <a:t>‹Nº›</a:t>
             </a:fld>
             <a:endParaRPr sz="1200" b="0" i="0" u="none" strike="noStrike" cap="none">
               <a:solidFill>
@@ -2287,7 +2289,361 @@
             </a:pPr>
             <a:fld id="{00000000-1234-1234-1234-123412341234}" type="slidenum">
               <a:rPr lang="es-MX"/>
-              <a:t>8</a:t>
+              <a:t>4</a:t>
+            </a:fld>
+            <a:endParaRPr/>
+          </a:p>
+        </p:txBody>
+      </p:sp>
+    </p:spTree>
+    <p:extLst>
+      <p:ext uri="{BB962C8B-B14F-4D97-AF65-F5344CB8AC3E}">
+        <p14:creationId xmlns:p14="http://schemas.microsoft.com/office/powerpoint/2010/main" val="3863682336"/>
+      </p:ext>
+    </p:extLst>
+  </p:cSld>
+  <p:clrMapOvr>
+    <a:masterClrMapping/>
+  </p:clrMapOvr>
+</p:notes>
+</file>
+
+<file path=ppt/notesSlides/notesSlide5.xml><?xml version="1.0" encoding="utf-8"?>
+<p:notes xmlns:a="http://schemas.openxmlformats.org/drawingml/2006/main" xmlns:r="http://schemas.openxmlformats.org/officeDocument/2006/relationships" xmlns:p="http://schemas.openxmlformats.org/presentationml/2006/main" showMasterSp="0" showMasterPhAnim="0">
+  <p:cSld>
+    <p:spTree>
+      <p:nvGrpSpPr>
+        <p:cNvPr id="1" name="Shape 170"/>
+        <p:cNvGrpSpPr/>
+        <p:nvPr/>
+      </p:nvGrpSpPr>
+      <p:grpSpPr>
+        <a:xfrm>
+          <a:off x="0" y="0"/>
+          <a:ext cx="0" cy="0"/>
+          <a:chOff x="0" y="0"/>
+          <a:chExt cx="0" cy="0"/>
+        </a:xfrm>
+      </p:grpSpPr>
+      <p:sp>
+        <p:nvSpPr>
+          <p:cNvPr id="171" name="Google Shape;171;p20:notes"/>
+          <p:cNvSpPr>
+            <a:spLocks noGrp="1" noRot="1" noChangeAspect="1"/>
+          </p:cNvSpPr>
+          <p:nvPr>
+            <p:ph type="sldImg" idx="2"/>
+          </p:nvPr>
+        </p:nvSpPr>
+        <p:spPr>
+          <a:xfrm>
+            <a:off x="1371600" y="1143000"/>
+            <a:ext cx="4114800" cy="3086100"/>
+          </a:xfrm>
+          <a:custGeom>
+            <a:avLst/>
+            <a:gdLst/>
+            <a:ahLst/>
+            <a:cxnLst/>
+            <a:rect l="l" t="t" r="r" b="b"/>
+            <a:pathLst>
+              <a:path w="120000" h="120000" extrusionOk="0">
+                <a:moveTo>
+                  <a:pt x="0" y="0"/>
+                </a:moveTo>
+                <a:lnTo>
+                  <a:pt x="120000" y="0"/>
+                </a:lnTo>
+                <a:lnTo>
+                  <a:pt x="120000" y="120000"/>
+                </a:lnTo>
+                <a:lnTo>
+                  <a:pt x="0" y="120000"/>
+                </a:lnTo>
+                <a:close/>
+              </a:path>
+            </a:pathLst>
+          </a:custGeom>
+          <a:noFill/>
+          <a:ln w="12700" cap="flat" cmpd="sng">
+            <a:solidFill>
+              <a:srgbClr val="000000"/>
+            </a:solidFill>
+            <a:prstDash val="solid"/>
+            <a:round/>
+            <a:headEnd type="none" w="sm" len="sm"/>
+            <a:tailEnd type="none" w="sm" len="sm"/>
+          </a:ln>
+        </p:spPr>
+      </p:sp>
+      <p:sp>
+        <p:nvSpPr>
+          <p:cNvPr id="172" name="Google Shape;172;p20:notes"/>
+          <p:cNvSpPr txBox="1">
+            <a:spLocks noGrp="1"/>
+          </p:cNvSpPr>
+          <p:nvPr>
+            <p:ph type="body" idx="1"/>
+          </p:nvPr>
+        </p:nvSpPr>
+        <p:spPr>
+          <a:xfrm>
+            <a:off x="685800" y="4400550"/>
+            <a:ext cx="5486400" cy="3600450"/>
+          </a:xfrm>
+          <a:prstGeom prst="rect">
+            <a:avLst/>
+          </a:prstGeom>
+          <a:noFill/>
+          <a:ln>
+            <a:noFill/>
+          </a:ln>
+        </p:spPr>
+        <p:txBody>
+          <a:bodyPr spcFirstLastPara="1" wrap="square" lIns="91425" tIns="45700" rIns="91425" bIns="45700" anchor="t" anchorCtr="0">
+            <a:noAutofit/>
+          </a:bodyPr>
+          <a:lstStyle/>
+          <a:p>
+            <a:pPr marL="0" lvl="0" indent="0" algn="l" rtl="0">
+              <a:lnSpc>
+                <a:spcPct val="100000"/>
+              </a:lnSpc>
+              <a:spcBef>
+                <a:spcPts val="0"/>
+              </a:spcBef>
+              <a:spcAft>
+                <a:spcPts val="0"/>
+              </a:spcAft>
+              <a:buSzPts val="1400"/>
+              <a:buNone/>
+            </a:pPr>
+            <a:endParaRPr dirty="0"/>
+          </a:p>
+        </p:txBody>
+      </p:sp>
+      <p:sp>
+        <p:nvSpPr>
+          <p:cNvPr id="173" name="Google Shape;173;p20:notes"/>
+          <p:cNvSpPr txBox="1">
+            <a:spLocks noGrp="1"/>
+          </p:cNvSpPr>
+          <p:nvPr>
+            <p:ph type="sldNum" idx="12"/>
+          </p:nvPr>
+        </p:nvSpPr>
+        <p:spPr>
+          <a:xfrm>
+            <a:off x="3884613" y="8685213"/>
+            <a:ext cx="2971800" cy="458787"/>
+          </a:xfrm>
+          <a:prstGeom prst="rect">
+            <a:avLst/>
+          </a:prstGeom>
+          <a:noFill/>
+          <a:ln>
+            <a:noFill/>
+          </a:ln>
+        </p:spPr>
+        <p:txBody>
+          <a:bodyPr spcFirstLastPara="1" wrap="square" lIns="91425" tIns="45700" rIns="91425" bIns="45700" anchor="b" anchorCtr="0">
+            <a:noAutofit/>
+          </a:bodyPr>
+          <a:lstStyle/>
+          <a:p>
+            <a:pPr marL="0" lvl="0" indent="0" algn="r" rtl="0">
+              <a:lnSpc>
+                <a:spcPct val="100000"/>
+              </a:lnSpc>
+              <a:spcBef>
+                <a:spcPts val="0"/>
+              </a:spcBef>
+              <a:spcAft>
+                <a:spcPts val="0"/>
+              </a:spcAft>
+              <a:buSzPts val="1400"/>
+              <a:buNone/>
+            </a:pPr>
+            <a:fld id="{00000000-1234-1234-1234-123412341234}" type="slidenum">
+              <a:rPr lang="es-MX"/>
+              <a:t>5</a:t>
+            </a:fld>
+            <a:endParaRPr/>
+          </a:p>
+        </p:txBody>
+      </p:sp>
+    </p:spTree>
+    <p:extLst>
+      <p:ext uri="{BB962C8B-B14F-4D97-AF65-F5344CB8AC3E}">
+        <p14:creationId xmlns:p14="http://schemas.microsoft.com/office/powerpoint/2010/main" val="4179686967"/>
+      </p:ext>
+    </p:extLst>
+  </p:cSld>
+  <p:clrMapOvr>
+    <a:masterClrMapping/>
+  </p:clrMapOvr>
+</p:notes>
+</file>
+
+<file path=ppt/notesSlides/notesSlide6.xml><?xml version="1.0" encoding="utf-8"?>
+<p:notes xmlns:a="http://schemas.openxmlformats.org/drawingml/2006/main" xmlns:r="http://schemas.openxmlformats.org/officeDocument/2006/relationships" xmlns:p="http://schemas.openxmlformats.org/presentationml/2006/main" showMasterSp="0" showMasterPhAnim="0">
+  <p:cSld>
+    <p:spTree>
+      <p:nvGrpSpPr>
+        <p:cNvPr id="1" name="Shape 170"/>
+        <p:cNvGrpSpPr/>
+        <p:nvPr/>
+      </p:nvGrpSpPr>
+      <p:grpSpPr>
+        <a:xfrm>
+          <a:off x="0" y="0"/>
+          <a:ext cx="0" cy="0"/>
+          <a:chOff x="0" y="0"/>
+          <a:chExt cx="0" cy="0"/>
+        </a:xfrm>
+      </p:grpSpPr>
+      <p:sp>
+        <p:nvSpPr>
+          <p:cNvPr id="171" name="Google Shape;171;p20:notes"/>
+          <p:cNvSpPr>
+            <a:spLocks noGrp="1" noRot="1" noChangeAspect="1"/>
+          </p:cNvSpPr>
+          <p:nvPr>
+            <p:ph type="sldImg" idx="2"/>
+          </p:nvPr>
+        </p:nvSpPr>
+        <p:spPr>
+          <a:xfrm>
+            <a:off x="1371600" y="1143000"/>
+            <a:ext cx="4114800" cy="3086100"/>
+          </a:xfrm>
+          <a:custGeom>
+            <a:avLst/>
+            <a:gdLst/>
+            <a:ahLst/>
+            <a:cxnLst/>
+            <a:rect l="l" t="t" r="r" b="b"/>
+            <a:pathLst>
+              <a:path w="120000" h="120000" extrusionOk="0">
+                <a:moveTo>
+                  <a:pt x="0" y="0"/>
+                </a:moveTo>
+                <a:lnTo>
+                  <a:pt x="120000" y="0"/>
+                </a:lnTo>
+                <a:lnTo>
+                  <a:pt x="120000" y="120000"/>
+                </a:lnTo>
+                <a:lnTo>
+                  <a:pt x="0" y="120000"/>
+                </a:lnTo>
+                <a:close/>
+              </a:path>
+            </a:pathLst>
+          </a:custGeom>
+          <a:noFill/>
+          <a:ln w="12700" cap="flat" cmpd="sng">
+            <a:solidFill>
+              <a:srgbClr val="000000"/>
+            </a:solidFill>
+            <a:prstDash val="solid"/>
+            <a:round/>
+            <a:headEnd type="none" w="sm" len="sm"/>
+            <a:tailEnd type="none" w="sm" len="sm"/>
+          </a:ln>
+        </p:spPr>
+      </p:sp>
+      <p:sp>
+        <p:nvSpPr>
+          <p:cNvPr id="172" name="Google Shape;172;p20:notes"/>
+          <p:cNvSpPr txBox="1">
+            <a:spLocks noGrp="1"/>
+          </p:cNvSpPr>
+          <p:nvPr>
+            <p:ph type="body" idx="1"/>
+          </p:nvPr>
+        </p:nvSpPr>
+        <p:spPr>
+          <a:xfrm>
+            <a:off x="685800" y="4400550"/>
+            <a:ext cx="5486400" cy="3600450"/>
+          </a:xfrm>
+          <a:prstGeom prst="rect">
+            <a:avLst/>
+          </a:prstGeom>
+          <a:noFill/>
+          <a:ln>
+            <a:noFill/>
+          </a:ln>
+        </p:spPr>
+        <p:txBody>
+          <a:bodyPr spcFirstLastPara="1" wrap="square" lIns="91425" tIns="45700" rIns="91425" bIns="45700" anchor="t" anchorCtr="0">
+            <a:noAutofit/>
+          </a:bodyPr>
+          <a:lstStyle/>
+          <a:p>
+            <a:pPr marL="0" lvl="0" indent="0" algn="l" rtl="0">
+              <a:lnSpc>
+                <a:spcPct val="100000"/>
+              </a:lnSpc>
+              <a:spcBef>
+                <a:spcPts val="0"/>
+              </a:spcBef>
+              <a:spcAft>
+                <a:spcPts val="0"/>
+              </a:spcAft>
+              <a:buSzPts val="1400"/>
+              <a:buNone/>
+            </a:pPr>
+            <a:endParaRPr dirty="0"/>
+          </a:p>
+        </p:txBody>
+      </p:sp>
+      <p:sp>
+        <p:nvSpPr>
+          <p:cNvPr id="173" name="Google Shape;173;p20:notes"/>
+          <p:cNvSpPr txBox="1">
+            <a:spLocks noGrp="1"/>
+          </p:cNvSpPr>
+          <p:nvPr>
+            <p:ph type="sldNum" idx="12"/>
+          </p:nvPr>
+        </p:nvSpPr>
+        <p:spPr>
+          <a:xfrm>
+            <a:off x="3884613" y="8685213"/>
+            <a:ext cx="2971800" cy="458787"/>
+          </a:xfrm>
+          <a:prstGeom prst="rect">
+            <a:avLst/>
+          </a:prstGeom>
+          <a:noFill/>
+          <a:ln>
+            <a:noFill/>
+          </a:ln>
+        </p:spPr>
+        <p:txBody>
+          <a:bodyPr spcFirstLastPara="1" wrap="square" lIns="91425" tIns="45700" rIns="91425" bIns="45700" anchor="b" anchorCtr="0">
+            <a:noAutofit/>
+          </a:bodyPr>
+          <a:lstStyle/>
+          <a:p>
+            <a:pPr marL="0" lvl="0" indent="0" algn="r" rtl="0">
+              <a:lnSpc>
+                <a:spcPct val="100000"/>
+              </a:lnSpc>
+              <a:spcBef>
+                <a:spcPts val="0"/>
+              </a:spcBef>
+              <a:spcAft>
+                <a:spcPts val="0"/>
+              </a:spcAft>
+              <a:buSzPts val="1400"/>
+              <a:buNone/>
+            </a:pPr>
+            <a:fld id="{00000000-1234-1234-1234-123412341234}" type="slidenum">
+              <a:rPr lang="es-MX"/>
+              <a:t>10</a:t>
             </a:fld>
             <a:endParaRPr/>
           </a:p>
@@ -2502,7 +2858,7 @@
             </a:pPr>
             <a:fld id="{00000000-1234-1234-1234-123412341234}" type="slidenum">
               <a:rPr lang="es-MX" smtClean="0"/>
-              <a:t>‹#›</a:t>
+              <a:t>‹Nº›</a:t>
             </a:fld>
             <a:endParaRPr lang="es-MX"/>
           </a:p>
@@ -2739,7 +3095,7 @@
             </a:pPr>
             <a:fld id="{00000000-1234-1234-1234-123412341234}" type="slidenum">
               <a:rPr lang="es-MX" smtClean="0"/>
-              <a:t>‹#›</a:t>
+              <a:t>‹Nº›</a:t>
             </a:fld>
             <a:endParaRPr lang="es-MX"/>
           </a:p>
@@ -2929,7 +3285,7 @@
             </a:pPr>
             <a:fld id="{00000000-1234-1234-1234-123412341234}" type="slidenum">
               <a:rPr lang="es-MX" smtClean="0"/>
-              <a:t>‹#›</a:t>
+              <a:t>‹Nº›</a:t>
             </a:fld>
             <a:endParaRPr lang="es-MX"/>
           </a:p>
@@ -4004,7 +4360,7 @@
             </a:pPr>
             <a:fld id="{00000000-1234-1234-1234-123412341234}" type="slidenum">
               <a:rPr lang="es-MX"/>
-              <a:t>‹#›</a:t>
+              <a:t>‹Nº›</a:t>
             </a:fld>
             <a:endParaRPr/>
           </a:p>
@@ -4179,7 +4535,7 @@
             </a:pPr>
             <a:fld id="{00000000-1234-1234-1234-123412341234}" type="slidenum">
               <a:rPr lang="es-MX" smtClean="0"/>
-              <a:t>‹#›</a:t>
+              <a:t>‹Nº›</a:t>
             </a:fld>
             <a:endParaRPr lang="es-MX"/>
           </a:p>
@@ -4464,7 +4820,7 @@
             </a:pPr>
             <a:fld id="{00000000-1234-1234-1234-123412341234}" type="slidenum">
               <a:rPr lang="es-MX" smtClean="0"/>
-              <a:t>‹#›</a:t>
+              <a:t>‹Nº›</a:t>
             </a:fld>
             <a:endParaRPr lang="es-MX"/>
           </a:p>
@@ -4737,7 +5093,7 @@
             </a:pPr>
             <a:fld id="{00000000-1234-1234-1234-123412341234}" type="slidenum">
               <a:rPr lang="es-MX" smtClean="0"/>
-              <a:t>‹#›</a:t>
+              <a:t>‹Nº›</a:t>
             </a:fld>
             <a:endParaRPr lang="es-MX"/>
           </a:p>
@@ -5190,7 +5546,7 @@
             </a:pPr>
             <a:fld id="{00000000-1234-1234-1234-123412341234}" type="slidenum">
               <a:rPr lang="es-MX" smtClean="0"/>
-              <a:t>‹#›</a:t>
+              <a:t>‹Nº›</a:t>
             </a:fld>
             <a:endParaRPr lang="es-MX"/>
           </a:p>
@@ -5344,7 +5700,7 @@
             </a:pPr>
             <a:fld id="{00000000-1234-1234-1234-123412341234}" type="slidenum">
               <a:rPr lang="es-MX" smtClean="0"/>
-              <a:t>‹#›</a:t>
+              <a:t>‹Nº›</a:t>
             </a:fld>
             <a:endParaRPr lang="es-MX"/>
           </a:p>
@@ -5445,7 +5801,7 @@
             </a:pPr>
             <a:fld id="{00000000-1234-1234-1234-123412341234}" type="slidenum">
               <a:rPr lang="es-MX" smtClean="0"/>
-              <a:t>‹#›</a:t>
+              <a:t>‹Nº›</a:t>
             </a:fld>
             <a:endParaRPr lang="es-MX"/>
           </a:p>
@@ -5704,7 +6060,7 @@
             </a:pPr>
             <a:fld id="{00000000-1234-1234-1234-123412341234}" type="slidenum">
               <a:rPr lang="es-MX" smtClean="0"/>
-              <a:t>‹#›</a:t>
+              <a:t>‹Nº›</a:t>
             </a:fld>
             <a:endParaRPr lang="es-MX"/>
           </a:p>
@@ -6160,7 +6516,7 @@
             </a:pPr>
             <a:fld id="{00000000-1234-1234-1234-123412341234}" type="slidenum">
               <a:rPr lang="es-MX" smtClean="0"/>
-              <a:t>‹#›</a:t>
+              <a:t>‹Nº›</a:t>
             </a:fld>
             <a:endParaRPr lang="es-MX"/>
           </a:p>
@@ -6559,7 +6915,7 @@
             </a:pPr>
             <a:fld id="{00000000-1234-1234-1234-123412341234}" type="slidenum">
               <a:rPr lang="es-MX" smtClean="0"/>
-              <a:t>‹#›</a:t>
+              <a:t>‹Nº›</a:t>
             </a:fld>
             <a:endParaRPr lang="es-MX"/>
           </a:p>
@@ -7420,6 +7776,641 @@
 </p:sld>
 </file>
 
+<file path=ppt/slides/slide10.xml><?xml version="1.0" encoding="utf-8"?>
+<p:sld xmlns:a="http://schemas.openxmlformats.org/drawingml/2006/main" xmlns:r="http://schemas.openxmlformats.org/officeDocument/2006/relationships" xmlns:p="http://schemas.openxmlformats.org/presentationml/2006/main">
+  <p:cSld>
+    <p:spTree>
+      <p:nvGrpSpPr>
+        <p:cNvPr id="1" name="Shape 174"/>
+        <p:cNvGrpSpPr/>
+        <p:nvPr/>
+      </p:nvGrpSpPr>
+      <p:grpSpPr>
+        <a:xfrm>
+          <a:off x="0" y="0"/>
+          <a:ext cx="0" cy="0"/>
+          <a:chOff x="0" y="0"/>
+          <a:chExt cx="0" cy="0"/>
+        </a:xfrm>
+      </p:grpSpPr>
+      <p:pic>
+        <p:nvPicPr>
+          <p:cNvPr id="175" name="Google Shape;175;p20"/>
+          <p:cNvPicPr preferRelativeResize="0"/>
+          <p:nvPr/>
+        </p:nvPicPr>
+        <p:blipFill rotWithShape="1">
+          <a:blip r:embed="rId3">
+            <a:alphaModFix/>
+          </a:blip>
+          <a:srcRect/>
+          <a:stretch/>
+        </p:blipFill>
+        <p:spPr>
+          <a:xfrm>
+            <a:off x="7771738" y="638110"/>
+            <a:ext cx="355521" cy="484114"/>
+          </a:xfrm>
+          <a:prstGeom prst="rect">
+            <a:avLst/>
+          </a:prstGeom>
+          <a:noFill/>
+          <a:ln>
+            <a:noFill/>
+          </a:ln>
+        </p:spPr>
+      </p:pic>
+      <p:cxnSp>
+        <p:nvCxnSpPr>
+          <p:cNvPr id="178" name="Google Shape;178;p20"/>
+          <p:cNvCxnSpPr/>
+          <p:nvPr/>
+        </p:nvCxnSpPr>
+        <p:spPr>
+          <a:xfrm>
+            <a:off x="7611205" y="638110"/>
+            <a:ext cx="0" cy="484113"/>
+          </a:xfrm>
+          <a:prstGeom prst="straightConnector1">
+            <a:avLst/>
+          </a:prstGeom>
+          <a:noFill/>
+          <a:ln w="9525" cap="flat" cmpd="sng">
+            <a:solidFill>
+              <a:srgbClr val="DEC9A2"/>
+            </a:solidFill>
+            <a:prstDash val="solid"/>
+            <a:miter lim="800000"/>
+            <a:headEnd type="none" w="sm" len="sm"/>
+            <a:tailEnd type="none" w="sm" len="sm"/>
+          </a:ln>
+        </p:spPr>
+      </p:cxnSp>
+      <p:sp>
+        <p:nvSpPr>
+          <p:cNvPr id="179" name="Google Shape;179;p20"/>
+          <p:cNvSpPr txBox="1"/>
+          <p:nvPr/>
+        </p:nvSpPr>
+        <p:spPr>
+          <a:xfrm>
+            <a:off x="495656" y="1302281"/>
+            <a:ext cx="8336475" cy="572625"/>
+          </a:xfrm>
+          <a:prstGeom prst="rect">
+            <a:avLst/>
+          </a:prstGeom>
+          <a:noFill/>
+          <a:ln>
+            <a:noFill/>
+          </a:ln>
+        </p:spPr>
+        <p:txBody>
+          <a:bodyPr spcFirstLastPara="1" wrap="square" lIns="68550" tIns="34275" rIns="68550" bIns="34275" anchor="ctr" anchorCtr="0">
+            <a:normAutofit fontScale="97500"/>
+          </a:bodyPr>
+          <a:lstStyle/>
+          <a:p>
+            <a:pPr marL="0" marR="0" lvl="0" indent="0" algn="ctr" rtl="0">
+              <a:lnSpc>
+                <a:spcPct val="100000"/>
+              </a:lnSpc>
+              <a:spcBef>
+                <a:spcPts val="0"/>
+              </a:spcBef>
+              <a:spcAft>
+                <a:spcPts val="0"/>
+              </a:spcAft>
+              <a:buClr>
+                <a:srgbClr val="BC945A"/>
+              </a:buClr>
+              <a:buSzPct val="102564"/>
+              <a:buFont typeface="Montserrat SemiBold"/>
+              <a:buNone/>
+            </a:pPr>
+            <a:r>
+              <a:rPr lang="es-MX" sz="3300" b="1" i="0" u="none" strike="noStrike" cap="none">
+                <a:solidFill>
+                  <a:srgbClr val="BC945A"/>
+                </a:solidFill>
+                <a:latin typeface="Montserrat SemiBold"/>
+                <a:ea typeface="Montserrat SemiBold"/>
+                <a:cs typeface="Montserrat SemiBold"/>
+                <a:sym typeface="Montserrat SemiBold"/>
+              </a:rPr>
+              <a:t>Sergio M. Nava Muñoz</a:t>
+            </a:r>
+            <a:endParaRPr sz="1400" b="0" i="0" u="none" strike="noStrike" cap="none">
+              <a:solidFill>
+                <a:srgbClr val="000000"/>
+              </a:solidFill>
+              <a:latin typeface="Arial"/>
+              <a:ea typeface="Arial"/>
+              <a:cs typeface="Arial"/>
+              <a:sym typeface="Arial"/>
+            </a:endParaRPr>
+          </a:p>
+        </p:txBody>
+      </p:sp>
+      <p:sp>
+        <p:nvSpPr>
+          <p:cNvPr id="180" name="Google Shape;180;p20"/>
+          <p:cNvSpPr txBox="1"/>
+          <p:nvPr/>
+        </p:nvSpPr>
+        <p:spPr>
+          <a:xfrm>
+            <a:off x="550333" y="2054963"/>
+            <a:ext cx="8281797" cy="3371270"/>
+          </a:xfrm>
+          <a:prstGeom prst="rect">
+            <a:avLst/>
+          </a:prstGeom>
+          <a:noFill/>
+          <a:ln>
+            <a:noFill/>
+          </a:ln>
+        </p:spPr>
+        <p:txBody>
+          <a:bodyPr spcFirstLastPara="1" wrap="square" lIns="68550" tIns="34275" rIns="68550" bIns="34275" anchor="t" anchorCtr="0">
+            <a:noAutofit/>
+          </a:bodyPr>
+          <a:lstStyle/>
+          <a:p>
+            <a:pPr marL="40004" marR="0" lvl="0" indent="0" algn="ctr" rtl="0">
+              <a:lnSpc>
+                <a:spcPct val="100000"/>
+              </a:lnSpc>
+              <a:spcBef>
+                <a:spcPts val="1000"/>
+              </a:spcBef>
+              <a:spcAft>
+                <a:spcPts val="0"/>
+              </a:spcAft>
+              <a:buClr>
+                <a:srgbClr val="888888"/>
+              </a:buClr>
+              <a:buSzPct val="110599"/>
+              <a:buFont typeface="Arial"/>
+              <a:buNone/>
+            </a:pPr>
+            <a:r>
+              <a:rPr lang="es-ES" b="0" i="0" u="none" strike="noStrike" cap="none" dirty="0">
+                <a:solidFill>
+                  <a:srgbClr val="833C0B"/>
+                </a:solidFill>
+                <a:latin typeface="Montserrat" panose="00000500000000000000" pitchFamily="2" charset="0"/>
+                <a:ea typeface="Montserrat"/>
+                <a:cs typeface="Montserrat"/>
+                <a:sym typeface="Montserrat"/>
+              </a:rPr>
+              <a:t>Información de Contacto</a:t>
+            </a:r>
+            <a:endParaRPr b="0" i="0" u="none" strike="noStrike" cap="none" dirty="0">
+              <a:solidFill>
+                <a:srgbClr val="833C0B"/>
+              </a:solidFill>
+              <a:latin typeface="Montserrat" panose="00000500000000000000" pitchFamily="2" charset="0"/>
+              <a:ea typeface="Montserrat"/>
+              <a:cs typeface="Montserrat"/>
+              <a:sym typeface="Montserrat"/>
+            </a:endParaRPr>
+          </a:p>
+          <a:p>
+            <a:pPr marL="457200" marR="0" lvl="0" indent="-228600" algn="l" rtl="0">
+              <a:lnSpc>
+                <a:spcPct val="100000"/>
+              </a:lnSpc>
+              <a:spcBef>
+                <a:spcPts val="1000"/>
+              </a:spcBef>
+              <a:spcAft>
+                <a:spcPts val="0"/>
+              </a:spcAft>
+              <a:buClr>
+                <a:srgbClr val="888888"/>
+              </a:buClr>
+              <a:buSzPct val="129032"/>
+              <a:buFont typeface="Arial"/>
+              <a:buChar char="•"/>
+            </a:pPr>
+            <a:r>
+              <a:rPr lang="es-MX" b="0" i="0" u="none" strike="noStrike" cap="none" dirty="0">
+                <a:solidFill>
+                  <a:srgbClr val="888888"/>
+                </a:solidFill>
+                <a:latin typeface="Montserrat" panose="00000500000000000000" pitchFamily="2" charset="0"/>
+                <a:ea typeface="Montserrat"/>
+                <a:cs typeface="Montserrat"/>
+                <a:sym typeface="Montserrat"/>
+              </a:rPr>
+              <a:t>Correo:  </a:t>
+            </a:r>
+            <a:r>
+              <a:rPr lang="es-MX" b="0" i="0" u="none" strike="noStrike" cap="none" dirty="0">
+                <a:solidFill>
+                  <a:srgbClr val="888888"/>
+                </a:solidFill>
+                <a:latin typeface="Montserrat" panose="00000500000000000000" pitchFamily="2" charset="0"/>
+                <a:ea typeface="Montserrat"/>
+                <a:cs typeface="Montserrat"/>
+                <a:sym typeface="Montserrat"/>
+                <a:hlinkClick r:id="rId4"/>
+              </a:rPr>
+              <a:t>nava@cimat.mx</a:t>
+            </a:r>
+            <a:r>
+              <a:rPr lang="es-MX" b="0" i="0" u="none" strike="noStrike" cap="none" dirty="0">
+                <a:solidFill>
+                  <a:srgbClr val="888888"/>
+                </a:solidFill>
+                <a:latin typeface="Montserrat" panose="00000500000000000000" pitchFamily="2" charset="0"/>
+                <a:ea typeface="Montserrat"/>
+                <a:cs typeface="Montserrat"/>
+                <a:sym typeface="Montserrat"/>
+              </a:rPr>
+              <a:t> 	  </a:t>
+            </a:r>
+            <a:r>
+              <a:rPr lang="es-MX" b="0" i="0" u="none" strike="noStrike" cap="none" dirty="0">
+                <a:solidFill>
+                  <a:srgbClr val="888888"/>
+                </a:solidFill>
+                <a:latin typeface="Montserrat" panose="00000500000000000000" pitchFamily="2" charset="0"/>
+                <a:ea typeface="Montserrat"/>
+                <a:cs typeface="Montserrat"/>
+                <a:sym typeface="Montserrat"/>
+                <a:hlinkClick r:id="rId5"/>
+              </a:rPr>
+              <a:t>s3rgio.nava@gmail.com</a:t>
+            </a:r>
+            <a:r>
+              <a:rPr lang="es-MX" b="0" i="0" u="none" strike="noStrike" cap="none" dirty="0">
+                <a:solidFill>
+                  <a:srgbClr val="888888"/>
+                </a:solidFill>
+                <a:latin typeface="Montserrat" panose="00000500000000000000" pitchFamily="2" charset="0"/>
+                <a:ea typeface="Montserrat"/>
+                <a:cs typeface="Montserrat"/>
+                <a:sym typeface="Montserrat"/>
+              </a:rPr>
+              <a:t> </a:t>
+            </a:r>
+          </a:p>
+          <a:p>
+            <a:pPr marL="457200" marR="0" lvl="0" indent="-228600" algn="l" rtl="0">
+              <a:lnSpc>
+                <a:spcPct val="100000"/>
+              </a:lnSpc>
+              <a:spcBef>
+                <a:spcPts val="1000"/>
+              </a:spcBef>
+              <a:spcAft>
+                <a:spcPts val="0"/>
+              </a:spcAft>
+              <a:buClr>
+                <a:srgbClr val="888888"/>
+              </a:buClr>
+              <a:buSzPct val="129032"/>
+              <a:buFont typeface="Arial"/>
+              <a:buChar char="•"/>
+            </a:pPr>
+            <a:r>
+              <a:rPr lang="es-MX" b="0" i="0" u="none" strike="noStrike" cap="none" dirty="0" err="1">
+                <a:solidFill>
+                  <a:srgbClr val="888888"/>
+                </a:solidFill>
+                <a:latin typeface="Montserrat" panose="00000500000000000000" pitchFamily="2" charset="0"/>
+                <a:ea typeface="Montserrat"/>
+                <a:cs typeface="Montserrat"/>
+                <a:sym typeface="Montserrat"/>
+              </a:rPr>
+              <a:t>Linkedin</a:t>
+            </a:r>
+            <a:r>
+              <a:rPr lang="es-MX" b="0" i="0" u="none" strike="noStrike" cap="none" dirty="0">
+                <a:solidFill>
+                  <a:srgbClr val="888888"/>
+                </a:solidFill>
+                <a:latin typeface="Montserrat" panose="00000500000000000000" pitchFamily="2" charset="0"/>
+                <a:ea typeface="Montserrat"/>
+                <a:cs typeface="Montserrat"/>
+                <a:sym typeface="Montserrat"/>
+              </a:rPr>
+              <a:t>: </a:t>
+            </a:r>
+            <a:r>
+              <a:rPr lang="es-MX" b="0" i="0" u="none" strike="noStrike" cap="none" dirty="0">
+                <a:solidFill>
+                  <a:srgbClr val="888888"/>
+                </a:solidFill>
+                <a:latin typeface="Montserrat" panose="00000500000000000000" pitchFamily="2" charset="0"/>
+                <a:ea typeface="Montserrat"/>
+                <a:cs typeface="Montserrat"/>
+                <a:sym typeface="Montserrat"/>
+                <a:hlinkClick r:id="rId6"/>
+              </a:rPr>
+              <a:t>https://www.linkedin.com/in/sergio-nava-a5a97517/</a:t>
+            </a:r>
+            <a:r>
+              <a:rPr lang="es-MX" b="0" i="0" u="none" strike="noStrike" cap="none" dirty="0">
+                <a:solidFill>
+                  <a:srgbClr val="888888"/>
+                </a:solidFill>
+                <a:latin typeface="Montserrat" panose="00000500000000000000" pitchFamily="2" charset="0"/>
+                <a:ea typeface="Montserrat"/>
+                <a:cs typeface="Montserrat"/>
+                <a:sym typeface="Montserrat"/>
+              </a:rPr>
+              <a:t> </a:t>
+            </a:r>
+          </a:p>
+          <a:p>
+            <a:pPr marL="228600" marR="0" lvl="0" algn="l" rtl="0">
+              <a:lnSpc>
+                <a:spcPct val="100000"/>
+              </a:lnSpc>
+              <a:spcBef>
+                <a:spcPts val="1000"/>
+              </a:spcBef>
+              <a:spcAft>
+                <a:spcPts val="0"/>
+              </a:spcAft>
+              <a:buClr>
+                <a:srgbClr val="888888"/>
+              </a:buClr>
+              <a:buSzPct val="129032"/>
+            </a:pPr>
+            <a:r>
+              <a:rPr lang="es-MX" b="0" i="0" u="none" strike="noStrike" cap="none" dirty="0">
+                <a:solidFill>
+                  <a:srgbClr val="888888"/>
+                </a:solidFill>
+                <a:latin typeface="Montserrat" panose="00000500000000000000" pitchFamily="2" charset="0"/>
+                <a:ea typeface="Montserrat"/>
+                <a:cs typeface="Montserrat"/>
+                <a:sym typeface="Montserrat"/>
+              </a:rPr>
+              <a:t>Redes Científicas:</a:t>
+            </a:r>
+          </a:p>
+          <a:p>
+            <a:pPr marL="457200" marR="0" lvl="0" indent="-228600" algn="l" rtl="0">
+              <a:lnSpc>
+                <a:spcPct val="100000"/>
+              </a:lnSpc>
+              <a:spcBef>
+                <a:spcPts val="1000"/>
+              </a:spcBef>
+              <a:spcAft>
+                <a:spcPts val="0"/>
+              </a:spcAft>
+              <a:buClr>
+                <a:srgbClr val="888888"/>
+              </a:buClr>
+              <a:buSzPct val="129032"/>
+              <a:buFont typeface="Arial"/>
+              <a:buChar char="•"/>
+            </a:pPr>
+            <a:r>
+              <a:rPr lang="es-MX" b="0" i="0" u="none" strike="noStrike" cap="none" dirty="0" err="1">
+                <a:solidFill>
+                  <a:srgbClr val="888888"/>
+                </a:solidFill>
+                <a:latin typeface="Montserrat" panose="00000500000000000000" pitchFamily="2" charset="0"/>
+                <a:ea typeface="Montserrat"/>
+                <a:cs typeface="Montserrat"/>
+                <a:sym typeface="Montserrat"/>
+              </a:rPr>
+              <a:t>Research</a:t>
+            </a:r>
+            <a:r>
+              <a:rPr lang="es-MX" b="0" i="0" u="none" strike="noStrike" cap="none" dirty="0">
+                <a:solidFill>
+                  <a:srgbClr val="888888"/>
+                </a:solidFill>
+                <a:latin typeface="Montserrat" panose="00000500000000000000" pitchFamily="2" charset="0"/>
+                <a:ea typeface="Montserrat"/>
+                <a:cs typeface="Montserrat"/>
+                <a:sym typeface="Montserrat"/>
+              </a:rPr>
+              <a:t> Gate: </a:t>
+            </a:r>
+            <a:r>
+              <a:rPr lang="es-MX" b="0" i="0" u="none" strike="noStrike" cap="none" dirty="0">
+                <a:solidFill>
+                  <a:srgbClr val="888888"/>
+                </a:solidFill>
+                <a:latin typeface="Montserrat" panose="00000500000000000000" pitchFamily="2" charset="0"/>
+                <a:ea typeface="Montserrat"/>
+                <a:cs typeface="Montserrat"/>
+                <a:sym typeface="Montserrat"/>
+                <a:hlinkClick r:id="rId7"/>
+              </a:rPr>
+              <a:t>https://www.researchgate.net/profile/Sergio-Nava</a:t>
+            </a:r>
+            <a:r>
+              <a:rPr lang="es-MX" b="0" i="0" u="none" strike="noStrike" cap="none" dirty="0">
+                <a:solidFill>
+                  <a:srgbClr val="888888"/>
+                </a:solidFill>
+                <a:latin typeface="Montserrat" panose="00000500000000000000" pitchFamily="2" charset="0"/>
+                <a:ea typeface="Montserrat"/>
+                <a:cs typeface="Montserrat"/>
+                <a:sym typeface="Montserrat"/>
+              </a:rPr>
+              <a:t>   </a:t>
+            </a:r>
+          </a:p>
+          <a:p>
+            <a:pPr marL="457200" marR="0" lvl="0" indent="-228600" algn="l" rtl="0">
+              <a:lnSpc>
+                <a:spcPct val="100000"/>
+              </a:lnSpc>
+              <a:spcBef>
+                <a:spcPts val="1000"/>
+              </a:spcBef>
+              <a:spcAft>
+                <a:spcPts val="0"/>
+              </a:spcAft>
+              <a:buClr>
+                <a:srgbClr val="888888"/>
+              </a:buClr>
+              <a:buSzPct val="129032"/>
+              <a:buFont typeface="Arial"/>
+              <a:buChar char="•"/>
+            </a:pPr>
+            <a:r>
+              <a:rPr lang="es-MX" b="0" i="0" u="none" strike="noStrike" cap="none" dirty="0">
+                <a:solidFill>
+                  <a:srgbClr val="888888"/>
+                </a:solidFill>
+                <a:latin typeface="Montserrat" panose="00000500000000000000" pitchFamily="2" charset="0"/>
+                <a:ea typeface="Montserrat"/>
+                <a:cs typeface="Montserrat"/>
+                <a:sym typeface="Montserrat"/>
+              </a:rPr>
+              <a:t>ORCID: </a:t>
+            </a:r>
+            <a:r>
+              <a:rPr lang="es-MX" b="0" i="0" u="none" strike="noStrike" cap="none" dirty="0">
+                <a:solidFill>
+                  <a:srgbClr val="888888"/>
+                </a:solidFill>
+                <a:latin typeface="Montserrat" panose="00000500000000000000" pitchFamily="2" charset="0"/>
+                <a:ea typeface="Montserrat"/>
+                <a:cs typeface="Montserrat"/>
+                <a:sym typeface="Montserrat"/>
+                <a:hlinkClick r:id="rId8"/>
+              </a:rPr>
+              <a:t>https://orcid.org/0000-0002-0298-3667</a:t>
+            </a:r>
+            <a:r>
+              <a:rPr lang="es-MX" b="0" i="0" u="none" strike="noStrike" cap="none" dirty="0">
+                <a:solidFill>
+                  <a:srgbClr val="888888"/>
+                </a:solidFill>
+                <a:latin typeface="Montserrat" panose="00000500000000000000" pitchFamily="2" charset="0"/>
+                <a:ea typeface="Montserrat"/>
+                <a:cs typeface="Montserrat"/>
+                <a:sym typeface="Montserrat"/>
+              </a:rPr>
+              <a:t> </a:t>
+            </a:r>
+          </a:p>
+          <a:p>
+            <a:pPr marL="457200" marR="0" lvl="0" indent="-228600" algn="l" rtl="0">
+              <a:lnSpc>
+                <a:spcPct val="100000"/>
+              </a:lnSpc>
+              <a:spcBef>
+                <a:spcPts val="1000"/>
+              </a:spcBef>
+              <a:spcAft>
+                <a:spcPts val="0"/>
+              </a:spcAft>
+              <a:buClr>
+                <a:srgbClr val="888888"/>
+              </a:buClr>
+              <a:buSzPct val="129032"/>
+              <a:buFont typeface="Arial"/>
+              <a:buChar char="•"/>
+            </a:pPr>
+            <a:r>
+              <a:rPr lang="es-MX" dirty="0">
+                <a:solidFill>
+                  <a:srgbClr val="888888"/>
+                </a:solidFill>
+                <a:latin typeface="Montserrat" panose="00000500000000000000" pitchFamily="2" charset="0"/>
+                <a:ea typeface="Montserrat"/>
+                <a:cs typeface="Montserrat"/>
+                <a:sym typeface="Montserrat"/>
+              </a:rPr>
+              <a:t>Google </a:t>
+            </a:r>
+            <a:r>
+              <a:rPr lang="es-MX" dirty="0" err="1">
+                <a:solidFill>
+                  <a:srgbClr val="888888"/>
+                </a:solidFill>
+                <a:latin typeface="Montserrat" panose="00000500000000000000" pitchFamily="2" charset="0"/>
+                <a:ea typeface="Montserrat"/>
+                <a:cs typeface="Montserrat"/>
+                <a:sym typeface="Montserrat"/>
+              </a:rPr>
+              <a:t>Scholar</a:t>
+            </a:r>
+            <a:r>
+              <a:rPr lang="es-MX" dirty="0">
+                <a:solidFill>
+                  <a:srgbClr val="888888"/>
+                </a:solidFill>
+                <a:latin typeface="Montserrat" panose="00000500000000000000" pitchFamily="2" charset="0"/>
+                <a:ea typeface="Montserrat"/>
+                <a:cs typeface="Montserrat"/>
+                <a:sym typeface="Montserrat"/>
+              </a:rPr>
+              <a:t>: </a:t>
+            </a:r>
+            <a:r>
+              <a:rPr lang="es-MX" dirty="0">
+                <a:solidFill>
+                  <a:srgbClr val="888888"/>
+                </a:solidFill>
+                <a:latin typeface="Montserrat" panose="00000500000000000000" pitchFamily="2" charset="0"/>
+                <a:ea typeface="Montserrat"/>
+                <a:cs typeface="Montserrat"/>
+                <a:sym typeface="Montserrat"/>
+                <a:hlinkClick r:id="rId9"/>
+              </a:rPr>
+              <a:t>https://scholar.google.es/citations?user=Fc9sxKgAAAAJ&amp;hl=es</a:t>
+            </a:r>
+            <a:r>
+              <a:rPr lang="es-MX" dirty="0">
+                <a:solidFill>
+                  <a:srgbClr val="888888"/>
+                </a:solidFill>
+                <a:latin typeface="Montserrat" panose="00000500000000000000" pitchFamily="2" charset="0"/>
+                <a:ea typeface="Montserrat"/>
+                <a:cs typeface="Montserrat"/>
+                <a:sym typeface="Montserrat"/>
+              </a:rPr>
+              <a:t> </a:t>
+            </a:r>
+            <a:endParaRPr lang="es-MX" b="0" i="0" u="none" strike="noStrike" cap="none" dirty="0">
+              <a:solidFill>
+                <a:srgbClr val="888888"/>
+              </a:solidFill>
+              <a:latin typeface="Montserrat" panose="00000500000000000000" pitchFamily="2" charset="0"/>
+              <a:ea typeface="Montserrat"/>
+              <a:cs typeface="Montserrat"/>
+              <a:sym typeface="Montserrat"/>
+            </a:endParaRPr>
+          </a:p>
+          <a:p>
+            <a:pPr marL="40004" marR="0" lvl="0" indent="0" algn="r" rtl="0">
+              <a:lnSpc>
+                <a:spcPct val="100000"/>
+              </a:lnSpc>
+              <a:spcBef>
+                <a:spcPts val="1000"/>
+              </a:spcBef>
+              <a:spcAft>
+                <a:spcPts val="0"/>
+              </a:spcAft>
+              <a:buClr>
+                <a:srgbClr val="000000"/>
+              </a:buClr>
+              <a:buSzPct val="110599"/>
+              <a:buFont typeface="Arial"/>
+              <a:buNone/>
+            </a:pPr>
+            <a:endParaRPr b="0" i="0" u="none" strike="noStrike" cap="none" dirty="0">
+              <a:solidFill>
+                <a:srgbClr val="000000"/>
+              </a:solidFill>
+              <a:latin typeface="Montserrat" panose="00000500000000000000" pitchFamily="2" charset="0"/>
+              <a:sym typeface="Arial"/>
+            </a:endParaRPr>
+          </a:p>
+        </p:txBody>
+      </p:sp>
+    </p:spTree>
+    <p:extLst>
+      <p:ext uri="{BB962C8B-B14F-4D97-AF65-F5344CB8AC3E}">
+        <p14:creationId xmlns:p14="http://schemas.microsoft.com/office/powerpoint/2010/main" val="2935186827"/>
+      </p:ext>
+    </p:extLst>
+  </p:cSld>
+  <p:clrMapOvr>
+    <a:masterClrMapping/>
+  </p:clrMapOvr>
+  <p:transition spd="slow">
+    <p:randomBar dir="vert"/>
+  </p:transition>
+</p:sld>
+</file>
+
 <file path=ppt/slides/slide2.xml><?xml version="1.0" encoding="utf-8"?>
 <p:sld xmlns:a="http://schemas.openxmlformats.org/drawingml/2006/main" xmlns:r="http://schemas.openxmlformats.org/officeDocument/2006/relationships" xmlns:p="http://schemas.openxmlformats.org/presentationml/2006/main">
   <p:cSld>
@@ -7564,8 +8555,8 @@
         </p:nvSpPr>
         <p:spPr>
           <a:xfrm>
-            <a:off x="371061" y="1874906"/>
-            <a:ext cx="8461069" cy="3392303"/>
+            <a:off x="371061" y="1709530"/>
+            <a:ext cx="8461069" cy="3557679"/>
           </a:xfrm>
           <a:prstGeom prst="rect">
             <a:avLst/>
@@ -7749,6 +8740,28 @@
                 <a:latin typeface="Montserrat" panose="00000500000000000000" pitchFamily="2" charset="0"/>
               </a:rPr>
               <a:t>Maestría en Ciencias Exactas, Sistemas y de la Información (UAA)</a:t>
+            </a:r>
+          </a:p>
+          <a:p>
+            <a:pPr marL="914400" lvl="1" indent="-228600">
+              <a:spcBef>
+                <a:spcPts val="1000"/>
+              </a:spcBef>
+              <a:buClr>
+                <a:srgbClr val="888888"/>
+              </a:buClr>
+              <a:buSzPct val="129032"/>
+              <a:buFont typeface="Arial"/>
+              <a:buChar char="•"/>
+            </a:pPr>
+            <a:r>
+              <a:rPr lang="es-MX" sz="1400" dirty="0">
+                <a:solidFill>
+                  <a:srgbClr val="833C0B"/>
+                </a:solidFill>
+                <a:latin typeface="Montserrat" panose="00000500000000000000" pitchFamily="2" charset="0"/>
+              </a:rPr>
+              <a:t>Maestría en Ciencia de Datos e Información (INFOTEC)</a:t>
             </a:r>
             <a:endParaRPr lang="es-ES" sz="1400" dirty="0">
               <a:solidFill>
@@ -8062,9 +9075,9 @@
                 <a:cs typeface="Montserrat SemiBold"/>
                 <a:sym typeface="Montserrat SemiBold"/>
               </a:rPr>
-              <a:t>Sergio M. Nava Muñoz</a:t>
-            </a:r>
-            <a:endParaRPr sz="1400" b="0" i="0" u="none" strike="noStrike" cap="none" dirty="0">
+              <a:t>Experiencia asesorando titulación</a:t>
+            </a:r>
+            <a:endParaRPr lang="es-MX" sz="1400" b="0" i="0" u="none" strike="noStrike" cap="none" dirty="0">
               <a:solidFill>
                 <a:srgbClr val="000000"/>
               </a:solidFill>
@@ -8101,46 +9114,6 @@
           </a:bodyPr>
           <a:lstStyle/>
           <a:p>
-            <a:pPr marL="40004" marR="0" lvl="0" indent="0" algn="r" rtl="0">
-              <a:lnSpc>
-                <a:spcPct val="100000"/>
-              </a:lnSpc>
-              <a:spcBef>
-                <a:spcPts val="1000"/>
-              </a:spcBef>
-              <a:spcAft>
-                <a:spcPts val="0"/>
-              </a:spcAft>
-              <a:buClr>
-                <a:srgbClr val="888888"/>
-              </a:buClr>
-              <a:buSzPct val="110599"/>
-              <a:buFont typeface="Arial"/>
-              <a:buNone/>
-            </a:pPr>
-            <a:r>
-              <a:rPr lang="es-MX" b="0" i="0" u="none" strike="noStrike" cap="none" dirty="0">
-                <a:solidFill>
-                  <a:srgbClr val="833C0B"/>
-                </a:solidFill>
-                <a:latin typeface="Montserrat" panose="00000500000000000000" pitchFamily="2" charset="0"/>
-                <a:ea typeface="Montserrat"/>
-                <a:cs typeface="Montserrat"/>
-                <a:sym typeface="Montserrat"/>
-              </a:rPr>
-              <a:t>Áreas de Interés</a:t>
-            </a:r>
-            <a:endParaRPr b="0" i="0" u="none" strike="noStrike" cap="none" dirty="0">
-              <a:solidFill>
-                <a:srgbClr val="833C0B"/>
-              </a:solidFill>
-              <a:latin typeface="Montserrat" panose="00000500000000000000" pitchFamily="2" charset="0"/>
-              <a:ea typeface="Montserrat"/>
-              <a:cs typeface="Montserrat"/>
-              <a:sym typeface="Montserrat"/>
-            </a:endParaRPr>
-          </a:p>
-          <a:p>
             <a:pPr marL="457200" marR="0" lvl="0" indent="-228600" algn="l" rtl="0">
               <a:lnSpc>
                 <a:spcPct val="100000"/>
@@ -8166,111 +9139,24 @@
                 <a:latin typeface="Montserrat" panose="00000500000000000000" pitchFamily="2" charset="0"/>
                 <a:sym typeface="Montserrat"/>
               </a:rPr>
-              <a:t>Estadística Aplicada a otras disciplinas</a:t>
-            </a:r>
-            <a:r>
-              <a:rPr lang="es-MX" b="0" i="0" u="none" strike="noStrike" cap="none" dirty="0">
+              <a:t>Trayectoria</a:t>
+            </a:r>
+            <a:r>
+              <a:rPr lang="es-MX" dirty="0">
                 <a:solidFill>
                   <a:srgbClr val="888888"/>
                 </a:solidFill>
                 <a:latin typeface="Montserrat" panose="00000500000000000000" pitchFamily="2" charset="0"/>
-                <a:ea typeface="Montserrat"/>
-                <a:cs typeface="Montserrat"/>
                 <a:sym typeface="Montserrat"/>
               </a:rPr>
-              <a:t>, Muestreo, Métodos Multivariados, Estadística para la Calidad, </a:t>
-            </a:r>
-            <a:r>
-              <a:rPr lang="es-MX" b="0" i="0" u="none" strike="noStrike" cap="none" dirty="0" err="1">
-                <a:solidFill>
-                  <a:srgbClr val="888888"/>
-                </a:solidFill>
-                <a:latin typeface="Montserrat" panose="00000500000000000000" pitchFamily="2" charset="0"/>
-                <a:ea typeface="Montserrat"/>
-                <a:cs typeface="Montserrat"/>
-                <a:sym typeface="Montserrat"/>
-              </a:rPr>
-              <a:t>Six</a:t>
-            </a:r>
-            <a:r>
-              <a:rPr lang="es-MX" b="0" i="0" u="none" strike="noStrike" cap="none" dirty="0">
-                <a:solidFill>
-                  <a:srgbClr val="888888"/>
-                </a:solidFill>
-                <a:latin typeface="Montserrat" panose="00000500000000000000" pitchFamily="2" charset="0"/>
-                <a:ea typeface="Montserrat"/>
-                <a:cs typeface="Montserrat"/>
-                <a:sym typeface="Montserrat"/>
-              </a:rPr>
-              <a:t> Sigma, </a:t>
-            </a:r>
-            <a:r>
-              <a:rPr lang="es-MX" dirty="0">
-                <a:solidFill>
-                  <a:srgbClr val="888888"/>
-                </a:solidFill>
-                <a:latin typeface="Montserrat" panose="00000500000000000000" pitchFamily="2" charset="0"/>
-                <a:ea typeface="Montserrat"/>
-                <a:cs typeface="Montserrat"/>
-                <a:sym typeface="Montserrat"/>
-              </a:rPr>
-              <a:t>Lean </a:t>
-            </a:r>
-            <a:r>
-              <a:rPr lang="es-MX" dirty="0" err="1">
-                <a:solidFill>
-                  <a:srgbClr val="888888"/>
-                </a:solidFill>
-                <a:latin typeface="Montserrat" panose="00000500000000000000" pitchFamily="2" charset="0"/>
-                <a:ea typeface="Montserrat"/>
-                <a:cs typeface="Montserrat"/>
-                <a:sym typeface="Montserrat"/>
-              </a:rPr>
-              <a:t>Manufacturing</a:t>
-            </a:r>
-            <a:r>
-              <a:rPr lang="es-MX" dirty="0">
-                <a:solidFill>
-                  <a:srgbClr val="888888"/>
-                </a:solidFill>
-                <a:latin typeface="Montserrat" panose="00000500000000000000" pitchFamily="2" charset="0"/>
-                <a:ea typeface="Montserrat"/>
-                <a:cs typeface="Montserrat"/>
-                <a:sym typeface="Montserrat"/>
-              </a:rPr>
-              <a:t>, </a:t>
-            </a:r>
-            <a:r>
-              <a:rPr lang="es-MX" b="0" i="0" u="none" strike="noStrike" cap="none" dirty="0">
-                <a:solidFill>
-                  <a:srgbClr val="888888"/>
-                </a:solidFill>
-                <a:latin typeface="Montserrat" panose="00000500000000000000" pitchFamily="2" charset="0"/>
-                <a:ea typeface="Montserrat"/>
-                <a:cs typeface="Montserrat"/>
-                <a:sym typeface="Montserrat"/>
-              </a:rPr>
-              <a:t>Estadística Espacial, Econometría, etc. </a:t>
-            </a:r>
-            <a:endParaRPr b="0" i="0" u="none" strike="noStrike" cap="none" dirty="0">
-              <a:solidFill>
-                <a:srgbClr val="000000"/>
-              </a:solidFill>
-              <a:latin typeface="Montserrat" panose="00000500000000000000" pitchFamily="2" charset="0"/>
-              <a:sym typeface="Arial"/>
-            </a:endParaRPr>
-          </a:p>
-          <a:p>
-            <a:pPr marL="457200" marR="0" lvl="0" indent="-228600" algn="l" rtl="0">
-              <a:lnSpc>
-                <a:spcPct val="100000"/>
-              </a:lnSpc>
+              <a:t>: más de 20 trabajos dirigidos/asesorados (Especialidad y Maestría) entre 2001–2023 en CIMAT y afines</a:t>
+            </a:r>
+          </a:p>
+          <a:p>
+            <a:pPr marL="457200" indent="-228600">
               <a:spcBef>
                 <a:spcPts val="1000"/>
               </a:spcBef>
-              <a:spcAft>
-                <a:spcPts val="0"/>
-              </a:spcAft>
               <a:buClr>
                 <a:srgbClr val="888888"/>
               </a:buClr>
@@ -8279,20 +9165,28 @@
               <a:buChar char="•"/>
             </a:pPr>
             <a:r>
-              <a:rPr lang="es-MX" b="0" i="0" u="none" strike="noStrike" cap="none" dirty="0">
+              <a:rPr lang="es-MX" dirty="0">
+                <a:solidFill>
+                  <a:srgbClr val="833C0B"/>
+                </a:solidFill>
+                <a:latin typeface="Montserrat" panose="00000500000000000000" pitchFamily="2" charset="0"/>
+                <a:sym typeface="Montserrat"/>
+              </a:rPr>
+              <a:t>Niveles: </a:t>
+            </a:r>
+            <a:r>
+              <a:rPr lang="es-MX" dirty="0">
                 <a:solidFill>
                   <a:srgbClr val="888888"/>
                 </a:solidFill>
                 <a:latin typeface="Montserrat" panose="00000500000000000000" pitchFamily="2" charset="0"/>
-                <a:ea typeface="Montserrat"/>
-                <a:cs typeface="Montserrat"/>
                 <a:sym typeface="Montserrat"/>
               </a:rPr>
-              <a:t>Ciencia de Datos, Inteligencia Artificial, Cómputo Estadístico.</a:t>
-            </a:r>
-          </a:p>
-          <a:p>
-            <a:pPr marL="457200" marR="0" lvl="0" indent="-228600" algn="l" rtl="0">
+              <a:t>Especialidad (aplicaciones industriales y sector público) y Maestría (proyectos con mayor profundidad metodológica). </a:t>
+            </a:r>
+          </a:p>
+          <a:p>
+            <a:pPr marL="457200" marR="0" lvl="0" indent="-228600">
               <a:lnSpc>
                 <a:spcPct val="100000"/>
               </a:lnSpc>
@@ -8312,55 +9206,28 @@
             <a:r>
               <a:rPr lang="es-MX" dirty="0">
                 <a:solidFill>
-                  <a:srgbClr val="888888"/>
+                  <a:srgbClr val="833C0B"/>
                 </a:solidFill>
                 <a:latin typeface="Montserrat" panose="00000500000000000000" pitchFamily="2" charset="0"/>
                 <a:sym typeface="Montserrat"/>
               </a:rPr>
-              <a:t>DCCD: </a:t>
+              <a:t>Enfoque metodológico: </a:t>
             </a:r>
             <a:r>
               <a:rPr lang="es-MX" dirty="0">
                 <a:solidFill>
-                  <a:srgbClr val="833C0B"/>
+                  <a:srgbClr val="888888"/>
                 </a:solidFill>
                 <a:latin typeface="Montserrat" panose="00000500000000000000" pitchFamily="2" charset="0"/>
                 <a:sym typeface="Montserrat"/>
               </a:rPr>
-              <a:t>Análisis del rendimiento de los sistemas en competencias  de procesamiento del lenguaje natural</a:t>
+              <a:t>estadística aplicada, multivariado, muestreo y diseño de experimentos, modelación y, más recientemente, ciencia de datos/ML (seguimiento ocular, clasificación/predicción).</a:t>
             </a:r>
             <a:endParaRPr dirty="0">
-              <a:solidFill>
-                <a:srgbClr val="833C0B"/>
-              </a:solidFill>
-              <a:latin typeface="Montserrat" panose="00000500000000000000" pitchFamily="2" charset="0"/>
-            </a:endParaRPr>
-          </a:p>
-          <a:p>
-            <a:pPr marL="457200" marR="0" lvl="0" indent="0" algn="l" rtl="0">
-              <a:lnSpc>
-                <a:spcPct val="100000"/>
-              </a:lnSpc>
-              <a:spcBef>
-                <a:spcPts val="1000"/>
-              </a:spcBef>
-              <a:spcAft>
-                <a:spcPts val="0"/>
-              </a:spcAft>
-              <a:buClr>
-                <a:srgbClr val="888888"/>
-              </a:buClr>
-              <a:buSzPct val="129032"/>
-              <a:buFont typeface="Arial"/>
-              <a:buNone/>
-            </a:pPr>
-            <a:endParaRPr b="0" i="0" u="none" strike="noStrike" cap="none" dirty="0">
               <a:solidFill>
                 <a:srgbClr val="888888"/>
               </a:solidFill>
               <a:latin typeface="Montserrat" panose="00000500000000000000" pitchFamily="2" charset="0"/>
-              <a:ea typeface="Montserrat"/>
-              <a:cs typeface="Montserrat"/>
               <a:sym typeface="Montserrat"/>
             </a:endParaRPr>
           </a:p>
@@ -8382,7 +9249,7 @@
               <a:buFont typeface="Arial"/>
               <a:buNone/>
             </a:pPr>
-            <a:endParaRPr b="0" i="0" u="none" strike="noStrike" cap="none" dirty="0">
+            <a:endParaRPr i="0" u="none" strike="noStrike" cap="none" dirty="0">
               <a:solidFill>
                 <a:srgbClr val="000000"/>
               </a:solidFill>
@@ -8418,6 +9285,936 @@
 </file>
 
 <file path=ppt/slides/slide4.xml><?xml version="1.0" encoding="utf-8"?>
+<p:sld xmlns:a="http://schemas.openxmlformats.org/drawingml/2006/main" xmlns:r="http://schemas.openxmlformats.org/officeDocument/2006/relationships" xmlns:p="http://schemas.openxmlformats.org/presentationml/2006/main">
+  <p:cSld>
+    <p:spTree>
+      <p:nvGrpSpPr>
+        <p:cNvPr id="1" name="Shape 174"/>
+        <p:cNvGrpSpPr/>
+        <p:nvPr/>
+      </p:nvGrpSpPr>
+      <p:grpSpPr>
+        <a:xfrm>
+          <a:off x="0" y="0"/>
+          <a:ext cx="0" cy="0"/>
+          <a:chOff x="0" y="0"/>
+          <a:chExt cx="0" cy="0"/>
+        </a:xfrm>
+      </p:grpSpPr>
+      <p:pic>
+        <p:nvPicPr>
+          <p:cNvPr id="175" name="Google Shape;175;p20"/>
+          <p:cNvPicPr preferRelativeResize="0"/>
+          <p:nvPr/>
+        </p:nvPicPr>
+        <p:blipFill rotWithShape="1">
+          <a:blip r:embed="rId3">
+            <a:alphaModFix/>
+          </a:blip>
+          <a:srcRect/>
+          <a:stretch/>
+        </p:blipFill>
+        <p:spPr>
+          <a:xfrm>
+            <a:off x="7771738" y="638110"/>
+            <a:ext cx="355521" cy="484114"/>
+          </a:xfrm>
+          <a:prstGeom prst="rect">
+            <a:avLst/>
+          </a:prstGeom>
+          <a:noFill/>
+          <a:ln>
+            <a:noFill/>
+          </a:ln>
+        </p:spPr>
+      </p:pic>
+      <p:cxnSp>
+        <p:nvCxnSpPr>
+          <p:cNvPr id="178" name="Google Shape;178;p20"/>
+          <p:cNvCxnSpPr/>
+          <p:nvPr/>
+        </p:nvCxnSpPr>
+        <p:spPr>
+          <a:xfrm>
+            <a:off x="7611205" y="638110"/>
+            <a:ext cx="0" cy="484113"/>
+          </a:xfrm>
+          <a:prstGeom prst="straightConnector1">
+            <a:avLst/>
+          </a:prstGeom>
+          <a:noFill/>
+          <a:ln w="9525" cap="flat" cmpd="sng">
+            <a:solidFill>
+              <a:srgbClr val="DEC9A2"/>
+            </a:solidFill>
+            <a:prstDash val="solid"/>
+            <a:miter lim="800000"/>
+            <a:headEnd type="none" w="sm" len="sm"/>
+            <a:tailEnd type="none" w="sm" len="sm"/>
+          </a:ln>
+        </p:spPr>
+      </p:cxnSp>
+      <p:sp>
+        <p:nvSpPr>
+          <p:cNvPr id="179" name="Google Shape;179;p20"/>
+          <p:cNvSpPr txBox="1"/>
+          <p:nvPr/>
+        </p:nvSpPr>
+        <p:spPr>
+          <a:xfrm>
+            <a:off x="495656" y="1302281"/>
+            <a:ext cx="8336475" cy="572625"/>
+          </a:xfrm>
+          <a:prstGeom prst="rect">
+            <a:avLst/>
+          </a:prstGeom>
+          <a:noFill/>
+          <a:ln>
+            <a:noFill/>
+          </a:ln>
+        </p:spPr>
+        <p:txBody>
+          <a:bodyPr spcFirstLastPara="1" wrap="square" lIns="68550" tIns="34275" rIns="68550" bIns="34275" anchor="ctr" anchorCtr="0">
+            <a:normAutofit fontScale="97500"/>
+          </a:bodyPr>
+          <a:lstStyle/>
+          <a:p>
+            <a:pPr marL="0" marR="0" lvl="0" indent="0" algn="ctr" rtl="0">
+              <a:lnSpc>
+                <a:spcPct val="100000"/>
+              </a:lnSpc>
+              <a:spcBef>
+                <a:spcPts val="0"/>
+              </a:spcBef>
+              <a:spcAft>
+                <a:spcPts val="0"/>
+              </a:spcAft>
+              <a:buClr>
+                <a:srgbClr val="BC945A"/>
+              </a:buClr>
+              <a:buSzPct val="102564"/>
+              <a:buFont typeface="Montserrat SemiBold"/>
+              <a:buNone/>
+            </a:pPr>
+            <a:r>
+              <a:rPr lang="es-MX" sz="3300" b="1" i="0" u="none" strike="noStrike" cap="none" dirty="0">
+                <a:solidFill>
+                  <a:srgbClr val="BC945A"/>
+                </a:solidFill>
+                <a:latin typeface="Montserrat SemiBold"/>
+                <a:ea typeface="Montserrat SemiBold"/>
+                <a:cs typeface="Montserrat SemiBold"/>
+                <a:sym typeface="Montserrat SemiBold"/>
+              </a:rPr>
+              <a:t>Áreas y temas representativos</a:t>
+            </a:r>
+            <a:endParaRPr lang="es-MX" sz="1400" b="0" i="0" u="none" strike="noStrike" cap="none" dirty="0">
+              <a:solidFill>
+                <a:srgbClr val="000000"/>
+              </a:solidFill>
+              <a:latin typeface="Arial"/>
+              <a:ea typeface="Arial"/>
+              <a:cs typeface="Arial"/>
+              <a:sym typeface="Arial"/>
+            </a:endParaRPr>
+          </a:p>
+        </p:txBody>
+      </p:sp>
+      <p:sp>
+        <p:nvSpPr>
+          <p:cNvPr id="180" name="Google Shape;180;p20"/>
+          <p:cNvSpPr txBox="1"/>
+          <p:nvPr/>
+        </p:nvSpPr>
+        <p:spPr>
+          <a:xfrm>
+            <a:off x="550334" y="1874906"/>
+            <a:ext cx="8053800" cy="3551327"/>
+          </a:xfrm>
+          <a:prstGeom prst="rect">
+            <a:avLst/>
+          </a:prstGeom>
+          <a:noFill/>
+          <a:ln>
+            <a:noFill/>
+          </a:ln>
+        </p:spPr>
+        <p:txBody>
+          <a:bodyPr spcFirstLastPara="1" wrap="square" lIns="68550" tIns="34275" rIns="68550" bIns="34275" anchor="t" anchorCtr="0">
+            <a:noAutofit/>
+          </a:bodyPr>
+          <a:lstStyle/>
+          <a:p>
+            <a:pPr marL="457200" marR="0" lvl="0" indent="-228600" algn="l" rtl="0">
+              <a:lnSpc>
+                <a:spcPct val="100000"/>
+              </a:lnSpc>
+              <a:spcBef>
+                <a:spcPts val="1000"/>
+              </a:spcBef>
+              <a:spcAft>
+                <a:spcPts val="0"/>
+              </a:spcAft>
+              <a:buClr>
+                <a:srgbClr val="888888"/>
+              </a:buClr>
+              <a:buSzPct val="129032"/>
+              <a:buFont typeface="Arial"/>
+              <a:buChar char="•"/>
+            </a:pPr>
+            <a:r>
+              <a:rPr lang="es-MX" sz="1600" dirty="0">
+                <a:solidFill>
+                  <a:srgbClr val="833C0B"/>
+                </a:solidFill>
+                <a:latin typeface="Montserrat" panose="00000500000000000000" pitchFamily="2" charset="0"/>
+                <a:sym typeface="Montserrat"/>
+              </a:rPr>
+              <a:t>Industria y calidad: </a:t>
+            </a:r>
+            <a:r>
+              <a:rPr lang="es-MX" sz="1600" dirty="0">
+                <a:solidFill>
+                  <a:srgbClr val="888888"/>
+                </a:solidFill>
+                <a:latin typeface="Montserrat" panose="00000500000000000000" pitchFamily="2" charset="0"/>
+                <a:sym typeface="Montserrat"/>
+              </a:rPr>
+              <a:t>muestreo de aceptación, estandarización de pruebas, metrología, eficiencia de equipos, mejora de procesos (textil/alimentos/electrónica). </a:t>
+            </a:r>
+            <a:endParaRPr lang="es-MX" dirty="0">
+              <a:solidFill>
+                <a:srgbClr val="888888"/>
+              </a:solidFill>
+              <a:latin typeface="Montserrat" panose="00000500000000000000" pitchFamily="2" charset="0"/>
+              <a:sym typeface="Montserrat"/>
+            </a:endParaRPr>
+          </a:p>
+          <a:p>
+            <a:pPr marL="457200" marR="0" lvl="0" indent="-228600" algn="l" rtl="0">
+              <a:lnSpc>
+                <a:spcPct val="100000"/>
+              </a:lnSpc>
+              <a:spcBef>
+                <a:spcPts val="1000"/>
+              </a:spcBef>
+              <a:spcAft>
+                <a:spcPts val="0"/>
+              </a:spcAft>
+              <a:buClr>
+                <a:srgbClr val="888888"/>
+              </a:buClr>
+              <a:buSzPct val="129032"/>
+              <a:buFont typeface="Arial"/>
+              <a:buChar char="•"/>
+            </a:pPr>
+            <a:r>
+              <a:rPr lang="es-MX" sz="1600" dirty="0">
+                <a:solidFill>
+                  <a:srgbClr val="833C0B"/>
+                </a:solidFill>
+                <a:latin typeface="Montserrat" panose="00000500000000000000" pitchFamily="2" charset="0"/>
+                <a:sym typeface="Montserrat"/>
+              </a:rPr>
+              <a:t>Socioeconómico y regional: </a:t>
+            </a:r>
+            <a:r>
+              <a:rPr lang="es-MX" sz="1600" dirty="0">
+                <a:solidFill>
+                  <a:srgbClr val="888888"/>
+                </a:solidFill>
+                <a:latin typeface="Montserrat" panose="00000500000000000000" pitchFamily="2" charset="0"/>
+                <a:sym typeface="Montserrat"/>
+              </a:rPr>
+              <a:t>regiones socioeconómicas (AGEB), migración, capital humano, evaluación de becas, auditoría pública. </a:t>
+            </a:r>
+          </a:p>
+          <a:p>
+            <a:pPr marL="457200" indent="-228600">
+              <a:spcBef>
+                <a:spcPts val="1000"/>
+              </a:spcBef>
+              <a:buClr>
+                <a:srgbClr val="888888"/>
+              </a:buClr>
+              <a:buSzPct val="129032"/>
+              <a:buFont typeface="Arial"/>
+              <a:buChar char="•"/>
+            </a:pPr>
+            <a:r>
+              <a:rPr lang="es-MX" sz="1600" dirty="0">
+                <a:solidFill>
+                  <a:srgbClr val="833C0B"/>
+                </a:solidFill>
+                <a:latin typeface="Montserrat" panose="00000500000000000000" pitchFamily="2" charset="0"/>
+                <a:sym typeface="Montserrat"/>
+              </a:rPr>
+              <a:t>Medio ambiente y salud: </a:t>
+            </a:r>
+            <a:r>
+              <a:rPr lang="es-MX" sz="1600" dirty="0">
+                <a:solidFill>
+                  <a:srgbClr val="888888"/>
+                </a:solidFill>
+                <a:latin typeface="Montserrat" panose="00000500000000000000" pitchFamily="2" charset="0"/>
+                <a:sym typeface="Montserrat"/>
+              </a:rPr>
+              <a:t>contaminación atmosférica (estudios longitudinales y de caracterización), enfermedades cardiovasculares (sala de cateterismo). </a:t>
+            </a:r>
+          </a:p>
+          <a:p>
+            <a:pPr marL="457200" marR="0" lvl="0" indent="-228600">
+              <a:lnSpc>
+                <a:spcPct val="100000"/>
+              </a:lnSpc>
+              <a:spcBef>
+                <a:spcPts val="1000"/>
+              </a:spcBef>
+              <a:spcAft>
+                <a:spcPts val="0"/>
+              </a:spcAft>
+              <a:buClr>
+                <a:srgbClr val="888888"/>
+              </a:buClr>
+              <a:buSzPct val="129032"/>
+              <a:buFont typeface="Arial"/>
+              <a:buChar char="•"/>
+            </a:pPr>
+            <a:r>
+              <a:rPr lang="es-MX" sz="1600" dirty="0">
+                <a:solidFill>
+                  <a:srgbClr val="833C0B"/>
+                </a:solidFill>
+                <a:latin typeface="Montserrat" panose="00000500000000000000" pitchFamily="2" charset="0"/>
+                <a:sym typeface="Montserrat"/>
+              </a:rPr>
+              <a:t>Educación y TIC: </a:t>
+            </a:r>
+            <a:r>
+              <a:rPr lang="es-MX" sz="1600" dirty="0">
+                <a:solidFill>
+                  <a:srgbClr val="888888"/>
+                </a:solidFill>
+                <a:latin typeface="Montserrat" panose="00000500000000000000" pitchFamily="2" charset="0"/>
+                <a:sym typeface="Montserrat"/>
+              </a:rPr>
+              <a:t>aprovechamiento escolar (bachillerato, EXANI II), disponibilidad/uso de TIC en México. </a:t>
+            </a:r>
+          </a:p>
+          <a:p>
+            <a:pPr marL="457200" indent="-228600">
+              <a:spcBef>
+                <a:spcPts val="1000"/>
+              </a:spcBef>
+              <a:buClr>
+                <a:srgbClr val="888888"/>
+              </a:buClr>
+              <a:buSzPct val="129032"/>
+              <a:buFont typeface="Arial"/>
+              <a:buChar char="•"/>
+            </a:pPr>
+            <a:r>
+              <a:rPr lang="es-MX" sz="1600" dirty="0">
+                <a:solidFill>
+                  <a:srgbClr val="833C0B"/>
+                </a:solidFill>
+                <a:latin typeface="Montserrat" panose="00000500000000000000" pitchFamily="2" charset="0"/>
+                <a:sym typeface="Montserrat"/>
+              </a:rPr>
+              <a:t>Negocios y deporte: </a:t>
+            </a:r>
+            <a:r>
+              <a:rPr lang="es-MX" sz="1600" dirty="0">
+                <a:solidFill>
+                  <a:srgbClr val="888888"/>
+                </a:solidFill>
+                <a:latin typeface="Montserrat" panose="00000500000000000000" pitchFamily="2" charset="0"/>
+                <a:sym typeface="Montserrat"/>
+              </a:rPr>
+              <a:t>clasificación de </a:t>
+            </a:r>
+            <a:r>
+              <a:rPr lang="es-MX" sz="1600" dirty="0" err="1">
+                <a:solidFill>
+                  <a:srgbClr val="888888"/>
+                </a:solidFill>
+                <a:latin typeface="Montserrat" panose="00000500000000000000" pitchFamily="2" charset="0"/>
+                <a:sym typeface="Montserrat"/>
+              </a:rPr>
+              <a:t>MiPyMEs</a:t>
+            </a:r>
+            <a:r>
+              <a:rPr lang="es-MX" sz="1600" dirty="0">
+                <a:solidFill>
+                  <a:srgbClr val="888888"/>
+                </a:solidFill>
+                <a:latin typeface="Montserrat" panose="00000500000000000000" pitchFamily="2" charset="0"/>
+                <a:sym typeface="Montserrat"/>
+              </a:rPr>
+              <a:t> del sector automotriz; análisis NFL con métodos multivariados.</a:t>
+            </a:r>
+          </a:p>
+          <a:p>
+            <a:pPr marL="457200" marR="0" lvl="0" indent="-228600" algn="l" rtl="0">
+              <a:lnSpc>
+                <a:spcPct val="100000"/>
+              </a:lnSpc>
+              <a:spcBef>
+                <a:spcPts val="1000"/>
+              </a:spcBef>
+              <a:spcAft>
+                <a:spcPts val="0"/>
+              </a:spcAft>
+              <a:buClr>
+                <a:srgbClr val="888888"/>
+              </a:buClr>
+              <a:buSzPct val="129032"/>
+              <a:buFont typeface="Arial"/>
+              <a:buChar char="•"/>
+            </a:pPr>
+            <a:r>
+              <a:rPr lang="es-MX" sz="1600" dirty="0">
+                <a:solidFill>
+                  <a:srgbClr val="833C0B"/>
+                </a:solidFill>
+                <a:latin typeface="Montserrat" panose="00000500000000000000" pitchFamily="2" charset="0"/>
+                <a:sym typeface="Montserrat"/>
+              </a:rPr>
+              <a:t>Ciencia de datos / ML: </a:t>
+            </a:r>
+            <a:r>
+              <a:rPr lang="es-MX" sz="1600" dirty="0" err="1">
+                <a:solidFill>
+                  <a:srgbClr val="888888"/>
+                </a:solidFill>
+                <a:latin typeface="Montserrat" panose="00000500000000000000" pitchFamily="2" charset="0"/>
+                <a:sym typeface="Montserrat"/>
+              </a:rPr>
+              <a:t>pupilometría</a:t>
+            </a:r>
+            <a:r>
+              <a:rPr lang="es-MX" sz="1600" dirty="0">
+                <a:solidFill>
+                  <a:srgbClr val="888888"/>
+                </a:solidFill>
+                <a:latin typeface="Montserrat" panose="00000500000000000000" pitchFamily="2" charset="0"/>
+                <a:sym typeface="Montserrat"/>
+              </a:rPr>
+              <a:t> para dificultad de memoria de trabajo (seguimiento ocular).</a:t>
+            </a:r>
+            <a:endParaRPr sz="1600" dirty="0">
+              <a:solidFill>
+                <a:srgbClr val="888888"/>
+              </a:solidFill>
+              <a:latin typeface="Montserrat" panose="00000500000000000000" pitchFamily="2" charset="0"/>
+              <a:sym typeface="Arial"/>
+            </a:endParaRPr>
+          </a:p>
+        </p:txBody>
+      </p:sp>
+    </p:spTree>
+    <p:extLst>
+      <p:ext uri="{BB962C8B-B14F-4D97-AF65-F5344CB8AC3E}">
+        <p14:creationId xmlns:p14="http://schemas.microsoft.com/office/powerpoint/2010/main" val="3853258159"/>
+      </p:ext>
+    </p:extLst>
+  </p:cSld>
+  <p:clrMapOvr>
+    <a:masterClrMapping/>
+  </p:clrMapOvr>
+  <mc:AlternateContent xmlns:mc="http://schemas.openxmlformats.org/markup-compatibility/2006">
+    <mc:Choice xmlns:p14="http://schemas.microsoft.com/office/powerpoint/2010/main" Requires="p14">
+      <p:transition spd="slow" p14:dur="3400">
+        <p14:reveal/>
+      </p:transition>
+    </mc:Choice>
+    <mc:Fallback>
+      <p:transition spd="slow">
+        <p:fade/>
+      </p:transition>
+    </mc:Fallback>
+  </mc:AlternateContent>
+</p:sld>
+</file>
+
+<file path=ppt/slides/slide5.xml><?xml version="1.0" encoding="utf-8"?>
+<p:sld xmlns:a="http://schemas.openxmlformats.org/drawingml/2006/main" xmlns:r="http://schemas.openxmlformats.org/officeDocument/2006/relationships" xmlns:p="http://schemas.openxmlformats.org/presentationml/2006/main">
+  <p:cSld>
+    <p:spTree>
+      <p:nvGrpSpPr>
+        <p:cNvPr id="1" name="Shape 174"/>
+        <p:cNvGrpSpPr/>
+        <p:nvPr/>
+      </p:nvGrpSpPr>
+      <p:grpSpPr>
+        <a:xfrm>
+          <a:off x="0" y="0"/>
+          <a:ext cx="0" cy="0"/>
+          <a:chOff x="0" y="0"/>
+          <a:chExt cx="0" cy="0"/>
+        </a:xfrm>
+      </p:grpSpPr>
+      <p:pic>
+        <p:nvPicPr>
+          <p:cNvPr id="175" name="Google Shape;175;p20"/>
+          <p:cNvPicPr preferRelativeResize="0"/>
+          <p:nvPr/>
+        </p:nvPicPr>
+        <p:blipFill rotWithShape="1">
+          <a:blip r:embed="rId3">
+            <a:alphaModFix/>
+          </a:blip>
+          <a:srcRect/>
+          <a:stretch/>
+        </p:blipFill>
+        <p:spPr>
+          <a:xfrm>
+            <a:off x="7771738" y="638110"/>
+            <a:ext cx="355521" cy="484114"/>
+          </a:xfrm>
+          <a:prstGeom prst="rect">
+            <a:avLst/>
+          </a:prstGeom>
+          <a:noFill/>
+          <a:ln>
+            <a:noFill/>
+          </a:ln>
+        </p:spPr>
+      </p:pic>
+      <p:cxnSp>
+        <p:nvCxnSpPr>
+          <p:cNvPr id="178" name="Google Shape;178;p20"/>
+          <p:cNvCxnSpPr/>
+          <p:nvPr/>
+        </p:nvCxnSpPr>
+        <p:spPr>
+          <a:xfrm>
+            <a:off x="7611205" y="638110"/>
+            <a:ext cx="0" cy="484113"/>
+          </a:xfrm>
+          <a:prstGeom prst="straightConnector1">
+            <a:avLst/>
+          </a:prstGeom>
+          <a:noFill/>
+          <a:ln w="9525" cap="flat" cmpd="sng">
+            <a:solidFill>
+              <a:srgbClr val="DEC9A2"/>
+            </a:solidFill>
+            <a:prstDash val="solid"/>
+            <a:miter lim="800000"/>
+            <a:headEnd type="none" w="sm" len="sm"/>
+            <a:tailEnd type="none" w="sm" len="sm"/>
+          </a:ln>
+        </p:spPr>
+      </p:cxnSp>
+      <p:sp>
+        <p:nvSpPr>
+          <p:cNvPr id="179" name="Google Shape;179;p20"/>
+          <p:cNvSpPr txBox="1"/>
+          <p:nvPr/>
+        </p:nvSpPr>
+        <p:spPr>
+          <a:xfrm>
+            <a:off x="495656" y="1302281"/>
+            <a:ext cx="8336475" cy="572625"/>
+          </a:xfrm>
+          <a:prstGeom prst="rect">
+            <a:avLst/>
+          </a:prstGeom>
+          <a:noFill/>
+          <a:ln>
+            <a:noFill/>
+          </a:ln>
+        </p:spPr>
+        <p:txBody>
+          <a:bodyPr spcFirstLastPara="1" wrap="square" lIns="68550" tIns="34275" rIns="68550" bIns="34275" anchor="ctr" anchorCtr="0">
+            <a:normAutofit fontScale="97500"/>
+          </a:bodyPr>
+          <a:lstStyle/>
+          <a:p>
+            <a:pPr marL="0" marR="0" lvl="0" indent="0" algn="ctr" rtl="0">
+              <a:lnSpc>
+                <a:spcPct val="100000"/>
+              </a:lnSpc>
+              <a:spcBef>
+                <a:spcPts val="0"/>
+              </a:spcBef>
+              <a:spcAft>
+                <a:spcPts val="0"/>
+              </a:spcAft>
+              <a:buClr>
+                <a:srgbClr val="BC945A"/>
+              </a:buClr>
+              <a:buSzPct val="102564"/>
+              <a:buFont typeface="Montserrat SemiBold"/>
+              <a:buNone/>
+            </a:pPr>
+            <a:r>
+              <a:rPr lang="es-MX" sz="3300" b="1" i="0" u="none" strike="noStrike" cap="none" dirty="0">
+                <a:solidFill>
+                  <a:srgbClr val="BC945A"/>
+                </a:solidFill>
+                <a:latin typeface="Montserrat SemiBold"/>
+                <a:ea typeface="Montserrat SemiBold"/>
+                <a:cs typeface="Montserrat SemiBold"/>
+                <a:sym typeface="Montserrat SemiBold"/>
+              </a:rPr>
+              <a:t>Sergio M. Nava Muñoz</a:t>
+            </a:r>
+            <a:endParaRPr sz="1400" b="0" i="0" u="none" strike="noStrike" cap="none" dirty="0">
+              <a:solidFill>
+                <a:srgbClr val="000000"/>
+              </a:solidFill>
+              <a:latin typeface="Arial"/>
+              <a:ea typeface="Arial"/>
+              <a:cs typeface="Arial"/>
+              <a:sym typeface="Arial"/>
+            </a:endParaRPr>
+          </a:p>
+        </p:txBody>
+      </p:sp>
+      <p:sp>
+        <p:nvSpPr>
+          <p:cNvPr id="180" name="Google Shape;180;p20"/>
+          <p:cNvSpPr txBox="1"/>
+          <p:nvPr/>
+        </p:nvSpPr>
+        <p:spPr>
+          <a:xfrm>
+            <a:off x="550334" y="2455333"/>
+            <a:ext cx="8053800" cy="2970900"/>
+          </a:xfrm>
+          <a:prstGeom prst="rect">
+            <a:avLst/>
+          </a:prstGeom>
+          <a:noFill/>
+          <a:ln>
+            <a:noFill/>
+          </a:ln>
+        </p:spPr>
+        <p:txBody>
+          <a:bodyPr spcFirstLastPara="1" wrap="square" lIns="68550" tIns="34275" rIns="68550" bIns="34275" anchor="t" anchorCtr="0">
+            <a:noAutofit/>
+          </a:bodyPr>
+          <a:lstStyle/>
+          <a:p>
+            <a:pPr marL="40004" marR="0" lvl="0" indent="0" algn="r" rtl="0">
+              <a:lnSpc>
+                <a:spcPct val="100000"/>
+              </a:lnSpc>
+              <a:spcBef>
+                <a:spcPts val="1000"/>
+              </a:spcBef>
+              <a:spcAft>
+                <a:spcPts val="0"/>
+              </a:spcAft>
+              <a:buClr>
+                <a:srgbClr val="888888"/>
+              </a:buClr>
+              <a:buSzPct val="110599"/>
+              <a:buFont typeface="Arial"/>
+              <a:buNone/>
+            </a:pPr>
+            <a:r>
+              <a:rPr lang="es-MX" b="0" i="0" u="none" strike="noStrike" cap="none" dirty="0">
+                <a:solidFill>
+                  <a:srgbClr val="833C0B"/>
+                </a:solidFill>
+                <a:latin typeface="Montserrat" panose="00000500000000000000" pitchFamily="2" charset="0"/>
+                <a:ea typeface="Montserrat"/>
+                <a:cs typeface="Montserrat"/>
+                <a:sym typeface="Montserrat"/>
+              </a:rPr>
+              <a:t>Áreas de Interés</a:t>
+            </a:r>
+            <a:endParaRPr b="0" i="0" u="none" strike="noStrike" cap="none" dirty="0">
+              <a:solidFill>
+                <a:srgbClr val="833C0B"/>
+              </a:solidFill>
+              <a:latin typeface="Montserrat" panose="00000500000000000000" pitchFamily="2" charset="0"/>
+              <a:ea typeface="Montserrat"/>
+              <a:cs typeface="Montserrat"/>
+              <a:sym typeface="Montserrat"/>
+            </a:endParaRPr>
+          </a:p>
+          <a:p>
+            <a:pPr marL="457200" marR="0" lvl="0" indent="-228600" algn="l" rtl="0">
+              <a:lnSpc>
+                <a:spcPct val="100000"/>
+              </a:lnSpc>
+              <a:spcBef>
+                <a:spcPts val="1000"/>
+              </a:spcBef>
+              <a:spcAft>
+                <a:spcPts val="0"/>
+              </a:spcAft>
+              <a:buClr>
+                <a:srgbClr val="888888"/>
+              </a:buClr>
+              <a:buSzPct val="129032"/>
+              <a:buFont typeface="Arial"/>
+              <a:buChar char="•"/>
+            </a:pPr>
+            <a:r>
+              <a:rPr lang="es-MX" dirty="0">
+                <a:solidFill>
+                  <a:srgbClr val="833C0B"/>
+                </a:solidFill>
+                <a:latin typeface="Montserrat" panose="00000500000000000000" pitchFamily="2" charset="0"/>
+                <a:sym typeface="Montserrat"/>
+              </a:rPr>
+              <a:t>Estadística Aplicada a otras disciplinas</a:t>
+            </a:r>
+            <a:r>
+              <a:rPr lang="es-MX" b="0" i="0" u="none" strike="noStrike" cap="none" dirty="0">
+                <a:solidFill>
+                  <a:srgbClr val="888888"/>
+                </a:solidFill>
+                <a:latin typeface="Montserrat" panose="00000500000000000000" pitchFamily="2" charset="0"/>
+                <a:ea typeface="Montserrat"/>
+                <a:cs typeface="Montserrat"/>
+                <a:sym typeface="Montserrat"/>
+              </a:rPr>
+              <a:t>, Muestreo, Métodos Multivariados, Estadística para la Calidad, </a:t>
+            </a:r>
+            <a:r>
+              <a:rPr lang="es-MX" b="0" i="0" u="none" strike="noStrike" cap="none" dirty="0" err="1">
+                <a:solidFill>
+                  <a:srgbClr val="888888"/>
+                </a:solidFill>
+                <a:latin typeface="Montserrat" panose="00000500000000000000" pitchFamily="2" charset="0"/>
+                <a:ea typeface="Montserrat"/>
+                <a:cs typeface="Montserrat"/>
+                <a:sym typeface="Montserrat"/>
+              </a:rPr>
+              <a:t>Six</a:t>
+            </a:r>
+            <a:r>
+              <a:rPr lang="es-MX" b="0" i="0" u="none" strike="noStrike" cap="none" dirty="0">
+                <a:solidFill>
+                  <a:srgbClr val="888888"/>
+                </a:solidFill>
+                <a:latin typeface="Montserrat" panose="00000500000000000000" pitchFamily="2" charset="0"/>
+                <a:ea typeface="Montserrat"/>
+                <a:cs typeface="Montserrat"/>
+                <a:sym typeface="Montserrat"/>
+              </a:rPr>
+              <a:t> Sigma, </a:t>
+            </a:r>
+            <a:r>
+              <a:rPr lang="es-MX" dirty="0">
+                <a:solidFill>
+                  <a:srgbClr val="888888"/>
+                </a:solidFill>
+                <a:latin typeface="Montserrat" panose="00000500000000000000" pitchFamily="2" charset="0"/>
+                <a:ea typeface="Montserrat"/>
+                <a:cs typeface="Montserrat"/>
+                <a:sym typeface="Montserrat"/>
+              </a:rPr>
+              <a:t>Lean </a:t>
+            </a:r>
+            <a:r>
+              <a:rPr lang="es-MX" dirty="0" err="1">
+                <a:solidFill>
+                  <a:srgbClr val="888888"/>
+                </a:solidFill>
+                <a:latin typeface="Montserrat" panose="00000500000000000000" pitchFamily="2" charset="0"/>
+                <a:ea typeface="Montserrat"/>
+                <a:cs typeface="Montserrat"/>
+                <a:sym typeface="Montserrat"/>
+              </a:rPr>
+              <a:t>Manufacturing</a:t>
+            </a:r>
+            <a:r>
+              <a:rPr lang="es-MX" dirty="0">
+                <a:solidFill>
+                  <a:srgbClr val="888888"/>
+                </a:solidFill>
+                <a:latin typeface="Montserrat" panose="00000500000000000000" pitchFamily="2" charset="0"/>
+                <a:ea typeface="Montserrat"/>
+                <a:cs typeface="Montserrat"/>
+                <a:sym typeface="Montserrat"/>
+              </a:rPr>
+              <a:t>, </a:t>
+            </a:r>
+            <a:r>
+              <a:rPr lang="es-MX" b="0" i="0" u="none" strike="noStrike" cap="none" dirty="0">
+                <a:solidFill>
+                  <a:srgbClr val="888888"/>
+                </a:solidFill>
+                <a:latin typeface="Montserrat" panose="00000500000000000000" pitchFamily="2" charset="0"/>
+                <a:ea typeface="Montserrat"/>
+                <a:cs typeface="Montserrat"/>
+                <a:sym typeface="Montserrat"/>
+              </a:rPr>
+              <a:t>Estadística Espacial, Econometría, etc. </a:t>
+            </a:r>
+            <a:endParaRPr b="0" i="0" u="none" strike="noStrike" cap="none" dirty="0">
+              <a:solidFill>
+                <a:srgbClr val="000000"/>
+              </a:solidFill>
+              <a:latin typeface="Montserrat" panose="00000500000000000000" pitchFamily="2" charset="0"/>
+              <a:sym typeface="Arial"/>
+            </a:endParaRPr>
+          </a:p>
+          <a:p>
+            <a:pPr marL="457200" marR="0" lvl="0" indent="-228600" algn="l" rtl="0">
+              <a:lnSpc>
+                <a:spcPct val="100000"/>
+              </a:lnSpc>
+              <a:spcBef>
+                <a:spcPts val="1000"/>
+              </a:spcBef>
+              <a:spcAft>
+                <a:spcPts val="0"/>
+              </a:spcAft>
+              <a:buClr>
+                <a:srgbClr val="888888"/>
+              </a:buClr>
+              <a:buSzPct val="129032"/>
+              <a:buFont typeface="Arial"/>
+              <a:buChar char="•"/>
+            </a:pPr>
+            <a:r>
+              <a:rPr lang="es-MX" b="0" i="0" u="none" strike="noStrike" cap="none" dirty="0">
+                <a:solidFill>
+                  <a:srgbClr val="888888"/>
+                </a:solidFill>
+                <a:latin typeface="Montserrat" panose="00000500000000000000" pitchFamily="2" charset="0"/>
+                <a:ea typeface="Montserrat"/>
+                <a:cs typeface="Montserrat"/>
+                <a:sym typeface="Montserrat"/>
+              </a:rPr>
+              <a:t>Ciencia de Datos, Inteligencia Artificial, Cómputo Estadístico.</a:t>
+            </a:r>
+          </a:p>
+          <a:p>
+            <a:pPr marL="457200" marR="0" lvl="0" indent="-228600" algn="l" rtl="0">
+              <a:lnSpc>
+                <a:spcPct val="100000"/>
+              </a:lnSpc>
+              <a:spcBef>
+                <a:spcPts val="1000"/>
+              </a:spcBef>
+              <a:spcAft>
+                <a:spcPts val="0"/>
+              </a:spcAft>
+              <a:buClr>
+                <a:srgbClr val="888888"/>
+              </a:buClr>
+              <a:buSzPct val="129032"/>
+              <a:buFont typeface="Arial"/>
+              <a:buChar char="•"/>
+            </a:pPr>
+            <a:r>
+              <a:rPr lang="es-MX" dirty="0">
+                <a:solidFill>
+                  <a:srgbClr val="888888"/>
+                </a:solidFill>
+                <a:latin typeface="Montserrat" panose="00000500000000000000" pitchFamily="2" charset="0"/>
+                <a:sym typeface="Montserrat"/>
+              </a:rPr>
+              <a:t>DCCD: </a:t>
+            </a:r>
+            <a:r>
+              <a:rPr lang="es-MX" dirty="0">
+                <a:solidFill>
+                  <a:srgbClr val="833C0B"/>
+                </a:solidFill>
+                <a:latin typeface="Montserrat" panose="00000500000000000000" pitchFamily="2" charset="0"/>
+                <a:sym typeface="Montserrat"/>
+              </a:rPr>
+              <a:t>Análisis del rendimiento de los sistemas en competencias  de procesamiento del lenguaje natural</a:t>
+            </a:r>
+            <a:endParaRPr dirty="0">
+              <a:solidFill>
+                <a:srgbClr val="833C0B"/>
+              </a:solidFill>
+              <a:latin typeface="Montserrat" panose="00000500000000000000" pitchFamily="2" charset="0"/>
+            </a:endParaRPr>
+          </a:p>
+          <a:p>
+            <a:pPr marL="457200" marR="0" lvl="0" indent="0" algn="l" rtl="0">
+              <a:lnSpc>
+                <a:spcPct val="100000"/>
+              </a:lnSpc>
+              <a:spcBef>
+                <a:spcPts val="1000"/>
+              </a:spcBef>
+              <a:spcAft>
+                <a:spcPts val="0"/>
+              </a:spcAft>
+              <a:buClr>
+                <a:srgbClr val="888888"/>
+              </a:buClr>
+              <a:buSzPct val="129032"/>
+              <a:buFont typeface="Arial"/>
+              <a:buNone/>
+            </a:pPr>
+            <a:endParaRPr b="0" i="0" u="none" strike="noStrike" cap="none" dirty="0">
+              <a:solidFill>
+                <a:srgbClr val="888888"/>
+              </a:solidFill>
+              <a:latin typeface="Montserrat" panose="00000500000000000000" pitchFamily="2" charset="0"/>
+              <a:ea typeface="Montserrat"/>
+              <a:cs typeface="Montserrat"/>
+              <a:sym typeface="Montserrat"/>
+            </a:endParaRPr>
+          </a:p>
+          <a:p>
+            <a:pPr marL="40004" marR="0" lvl="0" indent="0" algn="r" rtl="0">
+              <a:lnSpc>
+                <a:spcPct val="100000"/>
+              </a:lnSpc>
+              <a:spcBef>
+                <a:spcPts val="1000"/>
+              </a:spcBef>
+              <a:spcAft>
+                <a:spcPts val="0"/>
+              </a:spcAft>
+              <a:buClr>
+                <a:srgbClr val="000000"/>
+              </a:buClr>
+              <a:buSzPct val="110599"/>
+              <a:buFont typeface="Arial"/>
+              <a:buNone/>
+            </a:pPr>
+            <a:endParaRPr b="0" i="0" u="none" strike="noStrike" cap="none" dirty="0">
+              <a:solidFill>
+                <a:srgbClr val="000000"/>
+              </a:solidFill>
+              <a:latin typeface="Montserrat" panose="00000500000000000000" pitchFamily="2" charset="0"/>
+              <a:sym typeface="Arial"/>
+            </a:endParaRPr>
+          </a:p>
+        </p:txBody>
+      </p:sp>
+    </p:spTree>
+    <p:extLst>
+      <p:ext uri="{BB962C8B-B14F-4D97-AF65-F5344CB8AC3E}">
+        <p14:creationId xmlns:p14="http://schemas.microsoft.com/office/powerpoint/2010/main" val="3090768588"/>
+      </p:ext>
+    </p:extLst>
+  </p:cSld>
+  <p:clrMapOvr>
+    <a:masterClrMapping/>
+  </p:clrMapOvr>
+  <mc:AlternateContent xmlns:mc="http://schemas.openxmlformats.org/markup-compatibility/2006">
+    <mc:Choice xmlns:p14="http://schemas.microsoft.com/office/powerpoint/2010/main" Requires="p14">
+      <p:transition spd="slow" p14:dur="3400">
+        <p14:reveal/>
+      </p:transition>
+    </mc:Choice>
+    <mc:Fallback>
+      <p:transition spd="slow">
+        <p:fade/>
+      </p:transition>
+    </mc:Fallback>
+  </mc:AlternateContent>
+</p:sld>
+</file>
+
+<file path=ppt/slides/slide6.xml><?xml version="1.0" encoding="utf-8"?>
 <p:sld xmlns:a="http://schemas.openxmlformats.org/drawingml/2006/main" xmlns:r="http://schemas.openxmlformats.org/officeDocument/2006/relationships" xmlns:p="http://schemas.openxmlformats.org/presentationml/2006/main">
   <p:cSld>
     <p:spTree>
@@ -8671,7 +10468,7 @@
 </p:sld>
 </file>
 
-<file path=ppt/slides/slide5.xml><?xml version="1.0" encoding="utf-8"?>
+<file path=ppt/slides/slide7.xml><?xml version="1.0" encoding="utf-8"?>
 <p:sld xmlns:a="http://schemas.openxmlformats.org/drawingml/2006/main" xmlns:r="http://schemas.openxmlformats.org/officeDocument/2006/relationships" xmlns:p="http://schemas.openxmlformats.org/presentationml/2006/main">
   <p:cSld>
     <p:spTree>
@@ -8960,7 +10757,7 @@
 </p:sld>
 </file>
 
-<file path=ppt/slides/slide6.xml><?xml version="1.0" encoding="utf-8"?>
+<file path=ppt/slides/slide8.xml><?xml version="1.0" encoding="utf-8"?>
 <p:sld xmlns:a="http://schemas.openxmlformats.org/drawingml/2006/main" xmlns:r="http://schemas.openxmlformats.org/officeDocument/2006/relationships" xmlns:p="http://schemas.openxmlformats.org/presentationml/2006/main">
   <p:cSld>
     <p:spTree>
@@ -9175,7 +10972,7 @@
 </p:sld>
 </file>
 
-<file path=ppt/slides/slide7.xml><?xml version="1.0" encoding="utf-8"?>
+<file path=ppt/slides/slide9.xml><?xml version="1.0" encoding="utf-8"?>
 <p:sld xmlns:a="http://schemas.openxmlformats.org/drawingml/2006/main" xmlns:r="http://schemas.openxmlformats.org/officeDocument/2006/relationships" xmlns:p="http://schemas.openxmlformats.org/presentationml/2006/main">
   <p:cSld>
     <p:spTree>
@@ -9450,641 +11247,6 @@
   <p:clrMapOvr>
     <a:masterClrMapping/>
   </p:clrMapOvr>
-</p:sld>
-</file>
-
-<file path=ppt/slides/slide8.xml><?xml version="1.0" encoding="utf-8"?>
-<p:sld xmlns:a="http://schemas.openxmlformats.org/drawingml/2006/main" xmlns:r="http://schemas.openxmlformats.org/officeDocument/2006/relationships" xmlns:p="http://schemas.openxmlformats.org/presentationml/2006/main">
-  <p:cSld>
-    <p:spTree>
-      <p:nvGrpSpPr>
-        <p:cNvPr id="1" name="Shape 174"/>
-        <p:cNvGrpSpPr/>
-        <p:nvPr/>
-      </p:nvGrpSpPr>
-      <p:grpSpPr>
-        <a:xfrm>
-          <a:off x="0" y="0"/>
-          <a:ext cx="0" cy="0"/>
-          <a:chOff x="0" y="0"/>
-          <a:chExt cx="0" cy="0"/>
-        </a:xfrm>
-      </p:grpSpPr>
-      <p:pic>
-        <p:nvPicPr>
-          <p:cNvPr id="175" name="Google Shape;175;p20"/>
-          <p:cNvPicPr preferRelativeResize="0"/>
-          <p:nvPr/>
-        </p:nvPicPr>
-        <p:blipFill rotWithShape="1">
-          <a:blip r:embed="rId3">
-            <a:alphaModFix/>
-          </a:blip>
-          <a:srcRect/>
-          <a:stretch/>
-        </p:blipFill>
-        <p:spPr>
-          <a:xfrm>
-            <a:off x="7771738" y="638110"/>
-            <a:ext cx="355521" cy="484114"/>
-          </a:xfrm>
-          <a:prstGeom prst="rect">
-            <a:avLst/>
-          </a:prstGeom>
-          <a:noFill/>
-          <a:ln>
-            <a:noFill/>
-          </a:ln>
-        </p:spPr>
-      </p:pic>
-      <p:cxnSp>
-        <p:nvCxnSpPr>
-          <p:cNvPr id="178" name="Google Shape;178;p20"/>
-          <p:cNvCxnSpPr/>
-          <p:nvPr/>
-        </p:nvCxnSpPr>
-        <p:spPr>
-          <a:xfrm>
-            <a:off x="7611205" y="638110"/>
-            <a:ext cx="0" cy="484113"/>
-          </a:xfrm>
-          <a:prstGeom prst="straightConnector1">
-            <a:avLst/>
-          </a:prstGeom>
-          <a:noFill/>
-          <a:ln w="9525" cap="flat" cmpd="sng">
-            <a:solidFill>
-              <a:srgbClr val="DEC9A2"/>
-            </a:solidFill>
-            <a:prstDash val="solid"/>
-            <a:miter lim="800000"/>
-            <a:headEnd type="none" w="sm" len="sm"/>
-            <a:tailEnd type="none" w="sm" len="sm"/>
-          </a:ln>
-        </p:spPr>
-      </p:cxnSp>
-      <p:sp>
-        <p:nvSpPr>
-          <p:cNvPr id="179" name="Google Shape;179;p20"/>
-          <p:cNvSpPr txBox="1"/>
-          <p:nvPr/>
-        </p:nvSpPr>
-        <p:spPr>
-          <a:xfrm>
-            <a:off x="495656" y="1302281"/>
-            <a:ext cx="8336475" cy="572625"/>
-          </a:xfrm>
-          <a:prstGeom prst="rect">
-            <a:avLst/>
-          </a:prstGeom>
-          <a:noFill/>
-          <a:ln>
-            <a:noFill/>
-          </a:ln>
-        </p:spPr>
-        <p:txBody>
-          <a:bodyPr spcFirstLastPara="1" wrap="square" lIns="68550" tIns="34275" rIns="68550" bIns="34275" anchor="ctr" anchorCtr="0">
-            <a:normAutofit fontScale="97500"/>
-          </a:bodyPr>
-          <a:lstStyle/>
-          <a:p>
-            <a:pPr marL="0" marR="0" lvl="0" indent="0" algn="ctr" rtl="0">
-              <a:lnSpc>
-                <a:spcPct val="100000"/>
-              </a:lnSpc>
-              <a:spcBef>
-                <a:spcPts val="0"/>
-              </a:spcBef>
-              <a:spcAft>
-                <a:spcPts val="0"/>
-              </a:spcAft>
-              <a:buClr>
-                <a:srgbClr val="BC945A"/>
-              </a:buClr>
-              <a:buSzPct val="102564"/>
-              <a:buFont typeface="Montserrat SemiBold"/>
-              <a:buNone/>
-            </a:pPr>
-            <a:r>
-              <a:rPr lang="es-MX" sz="3300" b="1" i="0" u="none" strike="noStrike" cap="none">
-                <a:solidFill>
-                  <a:srgbClr val="BC945A"/>
-                </a:solidFill>
-                <a:latin typeface="Montserrat SemiBold"/>
-                <a:ea typeface="Montserrat SemiBold"/>
-                <a:cs typeface="Montserrat SemiBold"/>
-                <a:sym typeface="Montserrat SemiBold"/>
-              </a:rPr>
-              <a:t>Sergio M. Nava Muñoz</a:t>
-            </a:r>
-            <a:endParaRPr sz="1400" b="0" i="0" u="none" strike="noStrike" cap="none">
-              <a:solidFill>
-                <a:srgbClr val="000000"/>
-              </a:solidFill>
-              <a:latin typeface="Arial"/>
-              <a:ea typeface="Arial"/>
-              <a:cs typeface="Arial"/>
-              <a:sym typeface="Arial"/>
-            </a:endParaRPr>
-          </a:p>
-        </p:txBody>
-      </p:sp>
-      <p:sp>
-        <p:nvSpPr>
-          <p:cNvPr id="180" name="Google Shape;180;p20"/>
-          <p:cNvSpPr txBox="1"/>
-          <p:nvPr/>
-        </p:nvSpPr>
-        <p:spPr>
-          <a:xfrm>
-            <a:off x="550333" y="2054963"/>
-            <a:ext cx="8281797" cy="3371270"/>
-          </a:xfrm>
-          <a:prstGeom prst="rect">
-            <a:avLst/>
-          </a:prstGeom>
-          <a:noFill/>
-          <a:ln>
-            <a:noFill/>
-          </a:ln>
-        </p:spPr>
-        <p:txBody>
-          <a:bodyPr spcFirstLastPara="1" wrap="square" lIns="68550" tIns="34275" rIns="68550" bIns="34275" anchor="t" anchorCtr="0">
-            <a:noAutofit/>
-          </a:bodyPr>
-          <a:lstStyle/>
-          <a:p>
-            <a:pPr marL="40004" marR="0" lvl="0" indent="0" algn="ctr" rtl="0">
-              <a:lnSpc>
-                <a:spcPct val="100000"/>
-              </a:lnSpc>
-              <a:spcBef>
-                <a:spcPts val="1000"/>
-              </a:spcBef>
-              <a:spcAft>
-                <a:spcPts val="0"/>
-              </a:spcAft>
-              <a:buClr>
-                <a:srgbClr val="888888"/>
-              </a:buClr>
-              <a:buSzPct val="110599"/>
-              <a:buFont typeface="Arial"/>
-              <a:buNone/>
-            </a:pPr>
-            <a:r>
-              <a:rPr lang="es-ES" b="0" i="0" u="none" strike="noStrike" cap="none" dirty="0">
-                <a:solidFill>
-                  <a:srgbClr val="833C0B"/>
-                </a:solidFill>
-                <a:latin typeface="Montserrat" panose="00000500000000000000" pitchFamily="2" charset="0"/>
-                <a:ea typeface="Montserrat"/>
-                <a:cs typeface="Montserrat"/>
-                <a:sym typeface="Montserrat"/>
-              </a:rPr>
-              <a:t>Información de Contacto</a:t>
-            </a:r>
-            <a:endParaRPr b="0" i="0" u="none" strike="noStrike" cap="none" dirty="0">
-              <a:solidFill>
-                <a:srgbClr val="833C0B"/>
-              </a:solidFill>
-              <a:latin typeface="Montserrat" panose="00000500000000000000" pitchFamily="2" charset="0"/>
-              <a:ea typeface="Montserrat"/>
-              <a:cs typeface="Montserrat"/>
-              <a:sym typeface="Montserrat"/>
-            </a:endParaRPr>
-          </a:p>
-          <a:p>
-            <a:pPr marL="457200" marR="0" lvl="0" indent="-228600" algn="l" rtl="0">
-              <a:lnSpc>
-                <a:spcPct val="100000"/>
-              </a:lnSpc>
-              <a:spcBef>
-                <a:spcPts val="1000"/>
-              </a:spcBef>
-              <a:spcAft>
-                <a:spcPts val="0"/>
-              </a:spcAft>
-              <a:buClr>
-                <a:srgbClr val="888888"/>
-              </a:buClr>
-              <a:buSzPct val="129032"/>
-              <a:buFont typeface="Arial"/>
-              <a:buChar char="•"/>
-            </a:pPr>
-            <a:r>
-              <a:rPr lang="es-MX" b="0" i="0" u="none" strike="noStrike" cap="none" dirty="0">
-                <a:solidFill>
-                  <a:srgbClr val="888888"/>
-                </a:solidFill>
-                <a:latin typeface="Montserrat" panose="00000500000000000000" pitchFamily="2" charset="0"/>
-                <a:ea typeface="Montserrat"/>
-                <a:cs typeface="Montserrat"/>
-                <a:sym typeface="Montserrat"/>
-              </a:rPr>
-              <a:t>Correo:  </a:t>
-            </a:r>
-            <a:r>
-              <a:rPr lang="es-MX" b="0" i="0" u="none" strike="noStrike" cap="none" dirty="0">
-                <a:solidFill>
-                  <a:srgbClr val="888888"/>
-                </a:solidFill>
-                <a:latin typeface="Montserrat" panose="00000500000000000000" pitchFamily="2" charset="0"/>
-                <a:ea typeface="Montserrat"/>
-                <a:cs typeface="Montserrat"/>
-                <a:sym typeface="Montserrat"/>
-                <a:hlinkClick r:id="rId4"/>
-              </a:rPr>
-              <a:t>nava@cimat.mx</a:t>
-            </a:r>
-            <a:r>
-              <a:rPr lang="es-MX" b="0" i="0" u="none" strike="noStrike" cap="none" dirty="0">
-                <a:solidFill>
-                  <a:srgbClr val="888888"/>
-                </a:solidFill>
-                <a:latin typeface="Montserrat" panose="00000500000000000000" pitchFamily="2" charset="0"/>
-                <a:ea typeface="Montserrat"/>
-                <a:cs typeface="Montserrat"/>
-                <a:sym typeface="Montserrat"/>
-              </a:rPr>
-              <a:t> 	  </a:t>
-            </a:r>
-            <a:r>
-              <a:rPr lang="es-MX" b="0" i="0" u="none" strike="noStrike" cap="none" dirty="0">
-                <a:solidFill>
-                  <a:srgbClr val="888888"/>
-                </a:solidFill>
-                <a:latin typeface="Montserrat" panose="00000500000000000000" pitchFamily="2" charset="0"/>
-                <a:ea typeface="Montserrat"/>
-                <a:cs typeface="Montserrat"/>
-                <a:sym typeface="Montserrat"/>
-                <a:hlinkClick r:id="rId5"/>
-              </a:rPr>
-              <a:t>s3rgio.nava@gmail.com</a:t>
-            </a:r>
-            <a:r>
-              <a:rPr lang="es-MX" b="0" i="0" u="none" strike="noStrike" cap="none" dirty="0">
-                <a:solidFill>
-                  <a:srgbClr val="888888"/>
-                </a:solidFill>
-                <a:latin typeface="Montserrat" panose="00000500000000000000" pitchFamily="2" charset="0"/>
-                <a:ea typeface="Montserrat"/>
-                <a:cs typeface="Montserrat"/>
-                <a:sym typeface="Montserrat"/>
-              </a:rPr>
-              <a:t> </a:t>
-            </a:r>
-          </a:p>
-          <a:p>
-            <a:pPr marL="457200" marR="0" lvl="0" indent="-228600" algn="l" rtl="0">
-              <a:lnSpc>
-                <a:spcPct val="100000"/>
-              </a:lnSpc>
-              <a:spcBef>
-                <a:spcPts val="1000"/>
-              </a:spcBef>
-              <a:spcAft>
-                <a:spcPts val="0"/>
-              </a:spcAft>
-              <a:buClr>
-                <a:srgbClr val="888888"/>
-              </a:buClr>
-              <a:buSzPct val="129032"/>
-              <a:buFont typeface="Arial"/>
-              <a:buChar char="•"/>
-            </a:pPr>
-            <a:r>
-              <a:rPr lang="es-MX" b="0" i="0" u="none" strike="noStrike" cap="none" dirty="0" err="1">
-                <a:solidFill>
-                  <a:srgbClr val="888888"/>
-                </a:solidFill>
-                <a:latin typeface="Montserrat" panose="00000500000000000000" pitchFamily="2" charset="0"/>
-                <a:ea typeface="Montserrat"/>
-                <a:cs typeface="Montserrat"/>
-                <a:sym typeface="Montserrat"/>
-              </a:rPr>
-              <a:t>Linkedin</a:t>
-            </a:r>
-            <a:r>
-              <a:rPr lang="es-MX" b="0" i="0" u="none" strike="noStrike" cap="none" dirty="0">
-                <a:solidFill>
-                  <a:srgbClr val="888888"/>
-                </a:solidFill>
-                <a:latin typeface="Montserrat" panose="00000500000000000000" pitchFamily="2" charset="0"/>
-                <a:ea typeface="Montserrat"/>
-                <a:cs typeface="Montserrat"/>
-                <a:sym typeface="Montserrat"/>
-              </a:rPr>
-              <a:t>: </a:t>
-            </a:r>
-            <a:r>
-              <a:rPr lang="es-MX" b="0" i="0" u="none" strike="noStrike" cap="none" dirty="0">
-                <a:solidFill>
-                  <a:srgbClr val="888888"/>
-                </a:solidFill>
-                <a:latin typeface="Montserrat" panose="00000500000000000000" pitchFamily="2" charset="0"/>
-                <a:ea typeface="Montserrat"/>
-                <a:cs typeface="Montserrat"/>
-                <a:sym typeface="Montserrat"/>
-                <a:hlinkClick r:id="rId6"/>
-              </a:rPr>
-              <a:t>https://www.linkedin.com/in/sergio-nava-a5a97517/</a:t>
-            </a:r>
-            <a:r>
-              <a:rPr lang="es-MX" b="0" i="0" u="none" strike="noStrike" cap="none" dirty="0">
-                <a:solidFill>
-                  <a:srgbClr val="888888"/>
-                </a:solidFill>
-                <a:latin typeface="Montserrat" panose="00000500000000000000" pitchFamily="2" charset="0"/>
-                <a:ea typeface="Montserrat"/>
-                <a:cs typeface="Montserrat"/>
-                <a:sym typeface="Montserrat"/>
-              </a:rPr>
-              <a:t> </a:t>
-            </a:r>
-          </a:p>
-          <a:p>
-            <a:pPr marL="228600" marR="0" lvl="0" algn="l" rtl="0">
-              <a:lnSpc>
-                <a:spcPct val="100000"/>
-              </a:lnSpc>
-              <a:spcBef>
-                <a:spcPts val="1000"/>
-              </a:spcBef>
-              <a:spcAft>
-                <a:spcPts val="0"/>
-              </a:spcAft>
-              <a:buClr>
-                <a:srgbClr val="888888"/>
-              </a:buClr>
-              <a:buSzPct val="129032"/>
-            </a:pPr>
-            <a:r>
-              <a:rPr lang="es-MX" b="0" i="0" u="none" strike="noStrike" cap="none" dirty="0">
-                <a:solidFill>
-                  <a:srgbClr val="888888"/>
-                </a:solidFill>
-                <a:latin typeface="Montserrat" panose="00000500000000000000" pitchFamily="2" charset="0"/>
-                <a:ea typeface="Montserrat"/>
-                <a:cs typeface="Montserrat"/>
-                <a:sym typeface="Montserrat"/>
-              </a:rPr>
-              <a:t>Redes Científicas:</a:t>
-            </a:r>
-          </a:p>
-          <a:p>
-            <a:pPr marL="457200" marR="0" lvl="0" indent="-228600" algn="l" rtl="0">
-              <a:lnSpc>
-                <a:spcPct val="100000"/>
-              </a:lnSpc>
-              <a:spcBef>
-                <a:spcPts val="1000"/>
-              </a:spcBef>
-              <a:spcAft>
-                <a:spcPts val="0"/>
-              </a:spcAft>
-              <a:buClr>
-                <a:srgbClr val="888888"/>
-              </a:buClr>
-              <a:buSzPct val="129032"/>
-              <a:buFont typeface="Arial"/>
-              <a:buChar char="•"/>
-            </a:pPr>
-            <a:r>
-              <a:rPr lang="es-MX" b="0" i="0" u="none" strike="noStrike" cap="none" dirty="0" err="1">
-                <a:solidFill>
-                  <a:srgbClr val="888888"/>
-                </a:solidFill>
-                <a:latin typeface="Montserrat" panose="00000500000000000000" pitchFamily="2" charset="0"/>
-                <a:ea typeface="Montserrat"/>
-                <a:cs typeface="Montserrat"/>
-                <a:sym typeface="Montserrat"/>
-              </a:rPr>
-              <a:t>Research</a:t>
-            </a:r>
-            <a:r>
-              <a:rPr lang="es-MX" b="0" i="0" u="none" strike="noStrike" cap="none" dirty="0">
-                <a:solidFill>
-                  <a:srgbClr val="888888"/>
-                </a:solidFill>
-                <a:latin typeface="Montserrat" panose="00000500000000000000" pitchFamily="2" charset="0"/>
-                <a:ea typeface="Montserrat"/>
-                <a:cs typeface="Montserrat"/>
-                <a:sym typeface="Montserrat"/>
-              </a:rPr>
-              <a:t> Gate: </a:t>
-            </a:r>
-            <a:r>
-              <a:rPr lang="es-MX" b="0" i="0" u="none" strike="noStrike" cap="none" dirty="0">
-                <a:solidFill>
-                  <a:srgbClr val="888888"/>
-                </a:solidFill>
-                <a:latin typeface="Montserrat" panose="00000500000000000000" pitchFamily="2" charset="0"/>
-                <a:ea typeface="Montserrat"/>
-                <a:cs typeface="Montserrat"/>
-                <a:sym typeface="Montserrat"/>
-                <a:hlinkClick r:id="rId7"/>
-              </a:rPr>
-              <a:t>https://www.researchgate.net/profile/Sergio-Nava</a:t>
-            </a:r>
-            <a:r>
-              <a:rPr lang="es-MX" b="0" i="0" u="none" strike="noStrike" cap="none" dirty="0">
-                <a:solidFill>
-                  <a:srgbClr val="888888"/>
-                </a:solidFill>
-                <a:latin typeface="Montserrat" panose="00000500000000000000" pitchFamily="2" charset="0"/>
-                <a:ea typeface="Montserrat"/>
-                <a:cs typeface="Montserrat"/>
-                <a:sym typeface="Montserrat"/>
-              </a:rPr>
-              <a:t>   </a:t>
-            </a:r>
-          </a:p>
-          <a:p>
-            <a:pPr marL="457200" marR="0" lvl="0" indent="-228600" algn="l" rtl="0">
-              <a:lnSpc>
-                <a:spcPct val="100000"/>
-              </a:lnSpc>
-              <a:spcBef>
-                <a:spcPts val="1000"/>
-              </a:spcBef>
-              <a:spcAft>
-                <a:spcPts val="0"/>
-              </a:spcAft>
-              <a:buClr>
-                <a:srgbClr val="888888"/>
-              </a:buClr>
-              <a:buSzPct val="129032"/>
-              <a:buFont typeface="Arial"/>
-              <a:buChar char="•"/>
-            </a:pPr>
-            <a:r>
-              <a:rPr lang="es-MX" b="0" i="0" u="none" strike="noStrike" cap="none" dirty="0">
-                <a:solidFill>
-                  <a:srgbClr val="888888"/>
-                </a:solidFill>
-                <a:latin typeface="Montserrat" panose="00000500000000000000" pitchFamily="2" charset="0"/>
-                <a:ea typeface="Montserrat"/>
-                <a:cs typeface="Montserrat"/>
-                <a:sym typeface="Montserrat"/>
-              </a:rPr>
-              <a:t>ORCID: </a:t>
-            </a:r>
-            <a:r>
-              <a:rPr lang="es-MX" b="0" i="0" u="none" strike="noStrike" cap="none" dirty="0">
-                <a:solidFill>
-                  <a:srgbClr val="888888"/>
-                </a:solidFill>
-                <a:latin typeface="Montserrat" panose="00000500000000000000" pitchFamily="2" charset="0"/>
-                <a:ea typeface="Montserrat"/>
-                <a:cs typeface="Montserrat"/>
-                <a:sym typeface="Montserrat"/>
-                <a:hlinkClick r:id="rId8"/>
-              </a:rPr>
-              <a:t>https://orcid.org/0000-0002-0298-3667</a:t>
-            </a:r>
-            <a:r>
-              <a:rPr lang="es-MX" b="0" i="0" u="none" strike="noStrike" cap="none" dirty="0">
-                <a:solidFill>
-                  <a:srgbClr val="888888"/>
-                </a:solidFill>
-                <a:latin typeface="Montserrat" panose="00000500000000000000" pitchFamily="2" charset="0"/>
-                <a:ea typeface="Montserrat"/>
-                <a:cs typeface="Montserrat"/>
-                <a:sym typeface="Montserrat"/>
-              </a:rPr>
-              <a:t> </a:t>
-            </a:r>
-          </a:p>
-          <a:p>
-            <a:pPr marL="457200" marR="0" lvl="0" indent="-228600" algn="l" rtl="0">
-              <a:lnSpc>
-                <a:spcPct val="100000"/>
-              </a:lnSpc>
-              <a:spcBef>
-                <a:spcPts val="1000"/>
-              </a:spcBef>
-              <a:spcAft>
-                <a:spcPts val="0"/>
-              </a:spcAft>
-              <a:buClr>
-                <a:srgbClr val="888888"/>
-              </a:buClr>
-              <a:buSzPct val="129032"/>
-              <a:buFont typeface="Arial"/>
-              <a:buChar char="•"/>
-            </a:pPr>
-            <a:r>
-              <a:rPr lang="es-MX" dirty="0">
-                <a:solidFill>
-                  <a:srgbClr val="888888"/>
-                </a:solidFill>
-                <a:latin typeface="Montserrat" panose="00000500000000000000" pitchFamily="2" charset="0"/>
-                <a:ea typeface="Montserrat"/>
-                <a:cs typeface="Montserrat"/>
-                <a:sym typeface="Montserrat"/>
-              </a:rPr>
-              <a:t>Google </a:t>
-            </a:r>
-            <a:r>
-              <a:rPr lang="es-MX" dirty="0" err="1">
-                <a:solidFill>
-                  <a:srgbClr val="888888"/>
-                </a:solidFill>
-                <a:latin typeface="Montserrat" panose="00000500000000000000" pitchFamily="2" charset="0"/>
-                <a:ea typeface="Montserrat"/>
-                <a:cs typeface="Montserrat"/>
-                <a:sym typeface="Montserrat"/>
-              </a:rPr>
-              <a:t>Scholar</a:t>
-            </a:r>
-            <a:r>
-              <a:rPr lang="es-MX" dirty="0">
-                <a:solidFill>
-                  <a:srgbClr val="888888"/>
-                </a:solidFill>
-                <a:latin typeface="Montserrat" panose="00000500000000000000" pitchFamily="2" charset="0"/>
-                <a:ea typeface="Montserrat"/>
-                <a:cs typeface="Montserrat"/>
-                <a:sym typeface="Montserrat"/>
-              </a:rPr>
-              <a:t>: </a:t>
-            </a:r>
-            <a:r>
-              <a:rPr lang="es-MX" dirty="0">
-                <a:solidFill>
-                  <a:srgbClr val="888888"/>
-                </a:solidFill>
-                <a:latin typeface="Montserrat" panose="00000500000000000000" pitchFamily="2" charset="0"/>
-                <a:ea typeface="Montserrat"/>
-                <a:cs typeface="Montserrat"/>
-                <a:sym typeface="Montserrat"/>
-                <a:hlinkClick r:id="rId9"/>
-              </a:rPr>
-              <a:t>https://scholar.google.es/citations?user=Fc9sxKgAAAAJ&amp;hl=es</a:t>
-            </a:r>
-            <a:r>
-              <a:rPr lang="es-MX" dirty="0">
-                <a:solidFill>
-                  <a:srgbClr val="888888"/>
-                </a:solidFill>
-                <a:latin typeface="Montserrat" panose="00000500000000000000" pitchFamily="2" charset="0"/>
-                <a:ea typeface="Montserrat"/>
-                <a:cs typeface="Montserrat"/>
-                <a:sym typeface="Montserrat"/>
-              </a:rPr>
-              <a:t> </a:t>
-            </a:r>
-            <a:endParaRPr lang="es-MX" b="0" i="0" u="none" strike="noStrike" cap="none" dirty="0">
-              <a:solidFill>
-                <a:srgbClr val="888888"/>
-              </a:solidFill>
-              <a:latin typeface="Montserrat" panose="00000500000000000000" pitchFamily="2" charset="0"/>
-              <a:ea typeface="Montserrat"/>
-              <a:cs typeface="Montserrat"/>
-              <a:sym typeface="Montserrat"/>
-            </a:endParaRPr>
-          </a:p>
-          <a:p>
-            <a:pPr marL="40004" marR="0" lvl="0" indent="0" algn="r" rtl="0">
-              <a:lnSpc>
-                <a:spcPct val="100000"/>
-              </a:lnSpc>
-              <a:spcBef>
-                <a:spcPts val="1000"/>
-              </a:spcBef>
-              <a:spcAft>
-                <a:spcPts val="0"/>
-              </a:spcAft>
-              <a:buClr>
-                <a:srgbClr val="000000"/>
-              </a:buClr>
-              <a:buSzPct val="110599"/>
-              <a:buFont typeface="Arial"/>
-              <a:buNone/>
-            </a:pPr>
-            <a:endParaRPr b="0" i="0" u="none" strike="noStrike" cap="none" dirty="0">
-              <a:solidFill>
-                <a:srgbClr val="000000"/>
-              </a:solidFill>
-              <a:latin typeface="Montserrat" panose="00000500000000000000" pitchFamily="2" charset="0"/>
-              <a:sym typeface="Arial"/>
-            </a:endParaRPr>
-          </a:p>
-        </p:txBody>
-      </p:sp>
-    </p:spTree>
-    <p:extLst>
-      <p:ext uri="{BB962C8B-B14F-4D97-AF65-F5344CB8AC3E}">
-        <p14:creationId xmlns:p14="http://schemas.microsoft.com/office/powerpoint/2010/main" val="2935186827"/>
-      </p:ext>
-    </p:extLst>
-  </p:cSld>
-  <p:clrMapOvr>
-    <a:masterClrMapping/>
-  </p:clrMapOvr>
-  <p:transition spd="slow">
-    <p:randomBar dir="vert"/>
-  </p:transition>
 </p:sld>
 </file>
 

</xml_diff>